<commit_message>
week 7 materials and notes update
</commit_message>
<xml_diff>
--- a/labs/WSAA2.1 XML,JSON and CSV_ed.pptx
+++ b/labs/WSAA2.1 XML,JSON and CSV_ed.pptx
@@ -3554,7 +3554,7 @@
             <a:pPr algn="r">
               <a:buNone/>
             </a:pPr>
-            <a:fld id="{335862DE-2ECA-4D50-98C5-F1A8CBA16AB2}" type="slidenum">
+            <a:fld id="{B86BC4D5-9B3B-44F6-A142-550C0ADA113F}" type="slidenum">
               <a:rPr b="0" lang="en-IE" sz="1400" spc="-1" strike="noStrike">
                 <a:latin typeface="Times New Roman"/>
               </a:rPr>
@@ -3602,7 +3602,7 @@
         <p:spPr>
           <a:xfrm>
             <a:off x="216000" y="812520"/>
-            <a:ext cx="7126920" cy="4008600"/>
+            <a:ext cx="7126560" cy="4008240"/>
           </a:xfrm>
           <a:prstGeom prst="rect">
             <a:avLst/>
@@ -3625,7 +3625,7 @@
         <p:spPr>
           <a:xfrm>
             <a:off x="756000" y="5078520"/>
-            <a:ext cx="6047280" cy="4810680"/>
+            <a:ext cx="6046920" cy="4810320"/>
           </a:xfrm>
           <a:prstGeom prst="rect">
             <a:avLst/>
@@ -3645,6 +3645,9 @@
                 <a:spcPct val="100000"/>
               </a:lnSpc>
               <a:buNone/>
+              <a:tabLst>
+                <a:tab algn="l" pos="0"/>
+              </a:tabLst>
             </a:pPr>
             <a:r>
               <a:rPr b="0" lang="en-IE" sz="2000" spc="-1" strike="noStrike">
@@ -3662,6 +3665,9 @@
                 <a:spcPct val="100000"/>
               </a:lnSpc>
               <a:buNone/>
+              <a:tabLst>
+                <a:tab algn="l" pos="0"/>
+              </a:tabLst>
             </a:pPr>
             <a:r>
               <a:rPr b="0" lang="en-IE" sz="2000" spc="-1" strike="noStrike" u="sng">
@@ -3684,6 +3690,9 @@
                 <a:spcPct val="100000"/>
               </a:lnSpc>
               <a:buNone/>
+              <a:tabLst>
+                <a:tab algn="l" pos="0"/>
+              </a:tabLst>
             </a:pPr>
             <a:r>
               <a:rPr b="0" lang="en-IE" sz="2000" spc="-1" strike="noStrike" u="sng">
@@ -3706,6 +3715,9 @@
                 <a:spcPct val="100000"/>
               </a:lnSpc>
               <a:buNone/>
+              <a:tabLst>
+                <a:tab algn="l" pos="0"/>
+              </a:tabLst>
             </a:pPr>
             <a:r>
               <a:rPr b="0" lang="en-IE" sz="2000" spc="-1" strike="noStrike" u="sng">
@@ -3728,6 +3740,9 @@
                 <a:spcPct val="100000"/>
               </a:lnSpc>
               <a:buNone/>
+              <a:tabLst>
+                <a:tab algn="l" pos="0"/>
+              </a:tabLst>
             </a:pPr>
             <a:endParaRPr b="0" lang="en-IE" sz="2000" spc="-1" strike="noStrike">
               <a:latin typeface="Arial"/>
@@ -3739,6 +3754,9 @@
                 <a:spcPct val="100000"/>
               </a:lnSpc>
               <a:buNone/>
+              <a:tabLst>
+                <a:tab algn="l" pos="0"/>
+              </a:tabLst>
             </a:pPr>
             <a:r>
               <a:rPr b="0" lang="en-IE" sz="2000" spc="-1" strike="noStrike">
@@ -3756,6 +3774,9 @@
                 <a:spcPct val="100000"/>
               </a:lnSpc>
               <a:buNone/>
+              <a:tabLst>
+                <a:tab algn="l" pos="0"/>
+              </a:tabLst>
             </a:pPr>
             <a:r>
               <a:rPr b="0" lang="en-IE" sz="2000" spc="-1" strike="noStrike" u="sng">
@@ -3778,6 +3799,9 @@
                 <a:spcPct val="100000"/>
               </a:lnSpc>
               <a:buNone/>
+              <a:tabLst>
+                <a:tab algn="l" pos="0"/>
+              </a:tabLst>
             </a:pPr>
             <a:r>
               <a:rPr b="0" lang="en-IE" sz="2000" spc="-1" strike="noStrike" u="sng">
@@ -3800,6 +3824,9 @@
                 <a:spcPct val="100000"/>
               </a:lnSpc>
               <a:buNone/>
+              <a:tabLst>
+                <a:tab algn="l" pos="0"/>
+              </a:tabLst>
             </a:pPr>
             <a:endParaRPr b="0" lang="en-IE" sz="2000" spc="-1" strike="noStrike">
               <a:latin typeface="Arial"/>
@@ -3811,6 +3838,9 @@
                 <a:spcPct val="100000"/>
               </a:lnSpc>
               <a:buNone/>
+              <a:tabLst>
+                <a:tab algn="l" pos="0"/>
+              </a:tabLst>
             </a:pPr>
             <a:r>
               <a:rPr b="0" lang="en-IE" sz="2000" spc="-1" strike="noStrike">
@@ -3819,7 +3849,25 @@
                 </a:solidFill>
                 <a:latin typeface="Arial"/>
               </a:rPr>
-              <a:t>XML(older) is how web services used to serve data across the cloud. There's still a few web services that still give XML, so it's worth looking at and JSON is a more modern way, especially with Restful APIs.</a:t>
+              <a:t>XML(older) is how web services used to serve data across the cloud. There's still a </a:t>
+            </a:r>
+            <a:r>
+              <a:rPr b="0" lang="en-IE" sz="2000" spc="-1" strike="noStrike">
+                <a:solidFill>
+                  <a:srgbClr val="000000"/>
+                </a:solidFill>
+                <a:latin typeface="Arial"/>
+              </a:rPr>
+              <a:t>few web services that still give XML, so it's worth looking at and JSON is a more </a:t>
+            </a:r>
+            <a:r>
+              <a:rPr b="0" lang="en-IE" sz="2000" spc="-1" strike="noStrike">
+                <a:solidFill>
+                  <a:srgbClr val="000000"/>
+                </a:solidFill>
+                <a:latin typeface="Arial"/>
+              </a:rPr>
+              <a:t>modern way, especially with Restful APIs.</a:t>
             </a:r>
             <a:endParaRPr b="0" lang="en-IE" sz="2000" spc="-1" strike="noStrike">
               <a:latin typeface="Arial"/>
@@ -3831,7 +3879,33 @@
                 <a:spcPct val="100000"/>
               </a:lnSpc>
               <a:buNone/>
+              <a:tabLst>
+                <a:tab algn="l" pos="0"/>
+              </a:tabLst>
             </a:pPr>
+            <a:endParaRPr b="0" lang="en-IE" sz="2000" spc="-1" strike="noStrike">
+              <a:latin typeface="Arial"/>
+            </a:endParaRPr>
+          </a:p>
+          <a:p>
+            <a:pPr marL="216000" indent="-216000">
+              <a:lnSpc>
+                <a:spcPct val="100000"/>
+              </a:lnSpc>
+              <a:buNone/>
+              <a:tabLst>
+                <a:tab algn="l" pos="0"/>
+              </a:tabLst>
+            </a:pPr>
+            <a:r>
+              <a:rPr b="0" lang="en-IE" sz="2000" spc="-1" strike="noStrike">
+                <a:solidFill>
+                  <a:srgbClr val="000000"/>
+                </a:solidFill>
+                <a:latin typeface="Arial"/>
+              </a:rPr>
+              <a:t>Lecture on different ways of representing data. </a:t>
+            </a:r>
             <a:endParaRPr b="0" lang="en-IE" sz="2000" spc="-1" strike="noStrike">
               <a:latin typeface="Arial"/>
             </a:endParaRPr>
@@ -3873,7 +3947,7 @@
         <p:spPr>
           <a:xfrm>
             <a:off x="216000" y="812520"/>
-            <a:ext cx="7127280" cy="4008960"/>
+            <a:ext cx="7126920" cy="4008600"/>
           </a:xfrm>
           <a:prstGeom prst="rect">
             <a:avLst/>
@@ -3896,7 +3970,7 @@
         <p:spPr>
           <a:xfrm>
             <a:off x="755640" y="5078520"/>
-            <a:ext cx="6047280" cy="4810680"/>
+            <a:ext cx="6046920" cy="4810320"/>
           </a:xfrm>
           <a:prstGeom prst="rect">
             <a:avLst/>
@@ -3911,6 +3985,12 @@
             <a:noAutofit/>
           </a:bodyPr>
           <a:p>
+            <a:pPr marL="216000" indent="-216000">
+              <a:lnSpc>
+                <a:spcPct val="100000"/>
+              </a:lnSpc>
+              <a:buNone/>
+            </a:pPr>
             <a:r>
               <a:rPr b="0" lang="en-IE" sz="2000" spc="-1" strike="noStrike">
                 <a:latin typeface="Arial"/>
@@ -3922,6 +4002,12 @@
             </a:endParaRPr>
           </a:p>
           <a:p>
+            <a:pPr marL="216000" indent="-216000">
+              <a:lnSpc>
+                <a:spcPct val="100000"/>
+              </a:lnSpc>
+              <a:buNone/>
+            </a:pPr>
             <a:r>
               <a:rPr b="0" lang="en-IE" sz="2000" spc="-1" strike="noStrike">
                 <a:latin typeface="Arial"/>
@@ -3939,6 +4025,12 @@
             </a:endParaRPr>
           </a:p>
           <a:p>
+            <a:pPr marL="216000" indent="-216000">
+              <a:lnSpc>
+                <a:spcPct val="100000"/>
+              </a:lnSpc>
+              <a:buNone/>
+            </a:pPr>
             <a:r>
               <a:rPr b="0" lang="en-IE" sz="2000" spc="-1" strike="noStrike">
                 <a:latin typeface="Arial"/>
@@ -3986,7 +4078,7 @@
         <p:spPr>
           <a:xfrm>
             <a:off x="216000" y="812520"/>
-            <a:ext cx="7127280" cy="4008960"/>
+            <a:ext cx="7126920" cy="4008600"/>
           </a:xfrm>
           <a:prstGeom prst="rect">
             <a:avLst/>
@@ -4009,7 +4101,7 @@
         <p:spPr>
           <a:xfrm>
             <a:off x="755640" y="5078520"/>
-            <a:ext cx="6047280" cy="4810680"/>
+            <a:ext cx="6046920" cy="4810320"/>
           </a:xfrm>
           <a:prstGeom prst="rect">
             <a:avLst/>
@@ -4024,6 +4116,12 @@
             <a:noAutofit/>
           </a:bodyPr>
           <a:p>
+            <a:pPr marL="216000" indent="-216000">
+              <a:lnSpc>
+                <a:spcPct val="100000"/>
+              </a:lnSpc>
+              <a:buNone/>
+            </a:pPr>
             <a:r>
               <a:rPr b="0" lang="en-IE" sz="2000" spc="-1" strike="noStrike">
                 <a:latin typeface="Arial"/>
@@ -4071,7 +4169,7 @@
         <p:spPr>
           <a:xfrm>
             <a:off x="216000" y="812520"/>
-            <a:ext cx="7127280" cy="4008960"/>
+            <a:ext cx="7126920" cy="4008600"/>
           </a:xfrm>
           <a:prstGeom prst="rect">
             <a:avLst/>
@@ -4094,7 +4192,7 @@
         <p:spPr>
           <a:xfrm>
             <a:off x="755640" y="5078520"/>
-            <a:ext cx="6047280" cy="4810680"/>
+            <a:ext cx="6046920" cy="4810320"/>
           </a:xfrm>
           <a:prstGeom prst="rect">
             <a:avLst/>
@@ -4109,6 +4207,12 @@
             <a:noAutofit/>
           </a:bodyPr>
           <a:p>
+            <a:pPr marL="216000" indent="-216000">
+              <a:lnSpc>
+                <a:spcPct val="100000"/>
+              </a:lnSpc>
+              <a:buNone/>
+            </a:pPr>
             <a:r>
               <a:rPr b="0" lang="en-IE" sz="2000" spc="-1" strike="noStrike">
                 <a:latin typeface="Arial"/>
@@ -4126,6 +4230,12 @@
             </a:endParaRPr>
           </a:p>
           <a:p>
+            <a:pPr marL="216000" indent="-216000">
+              <a:lnSpc>
+                <a:spcPct val="100000"/>
+              </a:lnSpc>
+              <a:buNone/>
+            </a:pPr>
             <a:r>
               <a:rPr b="0" lang="en-IE" sz="2000" spc="-1" strike="noStrike">
                 <a:latin typeface="Arial"/>
@@ -4137,6 +4247,12 @@
             </a:endParaRPr>
           </a:p>
           <a:p>
+            <a:pPr marL="216000" indent="-216000">
+              <a:lnSpc>
+                <a:spcPct val="100000"/>
+              </a:lnSpc>
+              <a:buNone/>
+            </a:pPr>
             <a:r>
               <a:rPr b="0" lang="en-IE" sz="2000" spc="-1" strike="noStrike">
                 <a:latin typeface="Arial"/>
@@ -4184,7 +4300,7 @@
         <p:spPr>
           <a:xfrm>
             <a:off x="216000" y="812520"/>
-            <a:ext cx="7127280" cy="4008960"/>
+            <a:ext cx="7126920" cy="4008600"/>
           </a:xfrm>
           <a:prstGeom prst="rect">
             <a:avLst/>
@@ -4207,7 +4323,7 @@
         <p:spPr>
           <a:xfrm>
             <a:off x="755640" y="5078520"/>
-            <a:ext cx="6047280" cy="4810680"/>
+            <a:ext cx="6046920" cy="4810320"/>
           </a:xfrm>
           <a:prstGeom prst="rect">
             <a:avLst/>
@@ -4222,6 +4338,12 @@
             <a:noAutofit/>
           </a:bodyPr>
           <a:p>
+            <a:pPr marL="216000" indent="-216000">
+              <a:lnSpc>
+                <a:spcPct val="100000"/>
+              </a:lnSpc>
+              <a:buNone/>
+            </a:pPr>
             <a:r>
               <a:rPr b="0" lang="en-IE" sz="2000" spc="-1" strike="noStrike">
                 <a:latin typeface="Arial"/>
@@ -4233,6 +4355,12 @@
             </a:endParaRPr>
           </a:p>
           <a:p>
+            <a:pPr marL="216000" indent="-216000">
+              <a:lnSpc>
+                <a:spcPct val="100000"/>
+              </a:lnSpc>
+              <a:buNone/>
+            </a:pPr>
             <a:r>
               <a:rPr b="0" lang="en-IE" sz="2000" spc="-1" strike="noStrike">
                 <a:latin typeface="Arial"/>
@@ -4244,6 +4372,12 @@
             </a:endParaRPr>
           </a:p>
           <a:p>
+            <a:pPr marL="216000" indent="-216000">
+              <a:lnSpc>
+                <a:spcPct val="100000"/>
+              </a:lnSpc>
+              <a:buNone/>
+            </a:pPr>
             <a:r>
               <a:rPr b="0" lang="en-IE" sz="2000" spc="-1" strike="noStrike">
                 <a:latin typeface="Arial"/>
@@ -4291,7 +4425,7 @@
         <p:spPr>
           <a:xfrm>
             <a:off x="216000" y="812520"/>
-            <a:ext cx="7127280" cy="4008960"/>
+            <a:ext cx="7126920" cy="4008600"/>
           </a:xfrm>
           <a:prstGeom prst="rect">
             <a:avLst/>
@@ -4314,7 +4448,7 @@
         <p:spPr>
           <a:xfrm>
             <a:off x="755640" y="5078520"/>
-            <a:ext cx="6047280" cy="4810680"/>
+            <a:ext cx="6046920" cy="4810320"/>
           </a:xfrm>
           <a:prstGeom prst="rect">
             <a:avLst/>
@@ -4329,6 +4463,12 @@
             <a:noAutofit/>
           </a:bodyPr>
           <a:p>
+            <a:pPr marL="216000" indent="-216000">
+              <a:lnSpc>
+                <a:spcPct val="100000"/>
+              </a:lnSpc>
+              <a:buNone/>
+            </a:pPr>
             <a:r>
               <a:rPr b="0" lang="en-IE" sz="2000" spc="-1" strike="noStrike">
                 <a:latin typeface="Arial"/>
@@ -4346,6 +4486,12 @@
             </a:endParaRPr>
           </a:p>
           <a:p>
+            <a:pPr marL="216000" indent="-216000">
+              <a:lnSpc>
+                <a:spcPct val="100000"/>
+              </a:lnSpc>
+              <a:buNone/>
+            </a:pPr>
             <a:r>
               <a:rPr b="0" lang="en-IE" sz="2000" spc="-1" strike="noStrike">
                 <a:latin typeface="Arial"/>
@@ -4393,7 +4539,7 @@
         <p:spPr>
           <a:xfrm>
             <a:off x="216000" y="812520"/>
-            <a:ext cx="7127280" cy="4008960"/>
+            <a:ext cx="7126920" cy="4008600"/>
           </a:xfrm>
           <a:prstGeom prst="rect">
             <a:avLst/>
@@ -4416,7 +4562,7 @@
         <p:spPr>
           <a:xfrm>
             <a:off x="755640" y="5078520"/>
-            <a:ext cx="6047280" cy="4810680"/>
+            <a:ext cx="6046920" cy="4810320"/>
           </a:xfrm>
           <a:prstGeom prst="rect">
             <a:avLst/>
@@ -4431,6 +4577,12 @@
             <a:noAutofit/>
           </a:bodyPr>
           <a:p>
+            <a:pPr marL="216000" indent="-216000">
+              <a:lnSpc>
+                <a:spcPct val="100000"/>
+              </a:lnSpc>
+              <a:buNone/>
+            </a:pPr>
             <a:r>
               <a:rPr b="0" lang="en-IE" sz="2000" spc="-1" strike="noStrike">
                 <a:latin typeface="Arial"/>
@@ -4478,7 +4630,7 @@
         <p:spPr>
           <a:xfrm>
             <a:off x="216000" y="812520"/>
-            <a:ext cx="7127280" cy="4008960"/>
+            <a:ext cx="7126920" cy="4008600"/>
           </a:xfrm>
           <a:prstGeom prst="rect">
             <a:avLst/>
@@ -4501,7 +4653,7 @@
         <p:spPr>
           <a:xfrm>
             <a:off x="755640" y="5078520"/>
-            <a:ext cx="6047280" cy="4810680"/>
+            <a:ext cx="6046920" cy="4810320"/>
           </a:xfrm>
           <a:prstGeom prst="rect">
             <a:avLst/>
@@ -4516,6 +4668,12 @@
             <a:noAutofit/>
           </a:bodyPr>
           <a:p>
+            <a:pPr marL="216000" indent="-216000">
+              <a:lnSpc>
+                <a:spcPct val="100000"/>
+              </a:lnSpc>
+              <a:buNone/>
+            </a:pPr>
             <a:r>
               <a:rPr b="0" lang="en-IE" sz="2000" spc="-1" strike="noStrike">
                 <a:latin typeface="Arial"/>
@@ -4563,7 +4721,7 @@
         <p:spPr>
           <a:xfrm>
             <a:off x="216000" y="812520"/>
-            <a:ext cx="7127280" cy="4008960"/>
+            <a:ext cx="7126920" cy="4008600"/>
           </a:xfrm>
           <a:prstGeom prst="rect">
             <a:avLst/>
@@ -4586,7 +4744,7 @@
         <p:spPr>
           <a:xfrm>
             <a:off x="755640" y="5078520"/>
-            <a:ext cx="6047280" cy="4810680"/>
+            <a:ext cx="6046920" cy="4810320"/>
           </a:xfrm>
           <a:prstGeom prst="rect">
             <a:avLst/>
@@ -4601,6 +4759,12 @@
             <a:noAutofit/>
           </a:bodyPr>
           <a:p>
+            <a:pPr marL="216000" indent="-216000">
+              <a:lnSpc>
+                <a:spcPct val="100000"/>
+              </a:lnSpc>
+              <a:buNone/>
+            </a:pPr>
             <a:r>
               <a:rPr b="0" lang="en-IE" sz="2000" spc="-1" strike="noStrike">
                 <a:latin typeface="Arial"/>
@@ -4648,7 +4812,7 @@
         <p:spPr>
           <a:xfrm>
             <a:off x="216000" y="812520"/>
-            <a:ext cx="7127280" cy="4008960"/>
+            <a:ext cx="7126920" cy="4008600"/>
           </a:xfrm>
           <a:prstGeom prst="rect">
             <a:avLst/>
@@ -4671,7 +4835,7 @@
         <p:spPr>
           <a:xfrm>
             <a:off x="755640" y="5078520"/>
-            <a:ext cx="6047280" cy="4810680"/>
+            <a:ext cx="6046920" cy="4810320"/>
           </a:xfrm>
           <a:prstGeom prst="rect">
             <a:avLst/>
@@ -4686,6 +4850,12 @@
             <a:noAutofit/>
           </a:bodyPr>
           <a:p>
+            <a:pPr marL="216000" indent="-216000">
+              <a:lnSpc>
+                <a:spcPct val="100000"/>
+              </a:lnSpc>
+              <a:buNone/>
+            </a:pPr>
             <a:r>
               <a:rPr b="0" lang="en-IE" sz="2000" spc="-1" strike="noStrike">
                 <a:latin typeface="Arial"/>
@@ -4733,7 +4903,7 @@
         <p:spPr>
           <a:xfrm>
             <a:off x="216000" y="812520"/>
-            <a:ext cx="7127280" cy="4008960"/>
+            <a:ext cx="7126920" cy="4008600"/>
           </a:xfrm>
           <a:prstGeom prst="rect">
             <a:avLst/>
@@ -4756,7 +4926,7 @@
         <p:spPr>
           <a:xfrm>
             <a:off x="755640" y="5078520"/>
-            <a:ext cx="6047280" cy="4810680"/>
+            <a:ext cx="6046920" cy="4810320"/>
           </a:xfrm>
           <a:prstGeom prst="rect">
             <a:avLst/>
@@ -4771,6 +4941,12 @@
             <a:noAutofit/>
           </a:bodyPr>
           <a:p>
+            <a:pPr marL="216000" indent="-216000">
+              <a:lnSpc>
+                <a:spcPct val="100000"/>
+              </a:lnSpc>
+              <a:buNone/>
+            </a:pPr>
             <a:r>
               <a:rPr b="0" lang="en-IE" sz="2000" spc="-1" strike="noStrike">
                 <a:latin typeface="Arial"/>
@@ -4782,6 +4958,12 @@
             </a:endParaRPr>
           </a:p>
           <a:p>
+            <a:pPr marL="216000" indent="-216000">
+              <a:lnSpc>
+                <a:spcPct val="100000"/>
+              </a:lnSpc>
+              <a:buNone/>
+            </a:pPr>
             <a:r>
               <a:rPr b="0" lang="en-IE" sz="2000" spc="-1" strike="noStrike">
                 <a:latin typeface="Arial"/>
@@ -4835,7 +5017,7 @@
         <p:spPr>
           <a:xfrm>
             <a:off x="216000" y="812520"/>
-            <a:ext cx="7127280" cy="4008960"/>
+            <a:ext cx="7126920" cy="4008600"/>
           </a:xfrm>
           <a:prstGeom prst="rect">
             <a:avLst/>
@@ -4858,7 +5040,7 @@
         <p:spPr>
           <a:xfrm>
             <a:off x="0" y="5078520"/>
-            <a:ext cx="7559640" cy="5080680"/>
+            <a:ext cx="7559280" cy="5080320"/>
           </a:xfrm>
           <a:prstGeom prst="rect">
             <a:avLst/>
@@ -4873,6 +5055,12 @@
             <a:noAutofit/>
           </a:bodyPr>
           <a:p>
+            <a:pPr marL="216000" indent="-216000">
+              <a:lnSpc>
+                <a:spcPct val="100000"/>
+              </a:lnSpc>
+              <a:buNone/>
+            </a:pPr>
             <a:r>
               <a:rPr b="0" lang="en-IE" sz="1500" spc="-1" strike="noStrike">
                 <a:latin typeface="Arial"/>
@@ -4890,6 +5078,12 @@
             </a:endParaRPr>
           </a:p>
           <a:p>
+            <a:pPr marL="216000" indent="-216000">
+              <a:lnSpc>
+                <a:spcPct val="100000"/>
+              </a:lnSpc>
+              <a:buNone/>
+            </a:pPr>
             <a:r>
               <a:rPr b="0" lang="en-IE" sz="1500" spc="-1" strike="noStrike">
                 <a:latin typeface="Arial"/>
@@ -4901,6 +5095,12 @@
             </a:endParaRPr>
           </a:p>
           <a:p>
+            <a:pPr marL="216000" indent="-216000">
+              <a:lnSpc>
+                <a:spcPct val="100000"/>
+              </a:lnSpc>
+              <a:buNone/>
+            </a:pPr>
             <a:r>
               <a:rPr b="0" lang="en-IE" sz="1500" spc="-1" strike="noStrike">
                 <a:latin typeface="Arial"/>
@@ -4912,6 +5112,12 @@
             </a:endParaRPr>
           </a:p>
           <a:p>
+            <a:pPr marL="216000" indent="-216000">
+              <a:lnSpc>
+                <a:spcPct val="100000"/>
+              </a:lnSpc>
+              <a:buNone/>
+            </a:pPr>
             <a:r>
               <a:rPr b="0" lang="en-IE" sz="1500" spc="-1" strike="noStrike">
                 <a:latin typeface="Arial"/>
@@ -4959,7 +5165,7 @@
         <p:spPr>
           <a:xfrm>
             <a:off x="216000" y="812520"/>
-            <a:ext cx="7127280" cy="4008960"/>
+            <a:ext cx="7126920" cy="4008600"/>
           </a:xfrm>
           <a:prstGeom prst="rect">
             <a:avLst/>
@@ -4982,7 +5188,7 @@
         <p:spPr>
           <a:xfrm>
             <a:off x="755640" y="5078520"/>
-            <a:ext cx="6047280" cy="4810680"/>
+            <a:ext cx="6046920" cy="4810320"/>
           </a:xfrm>
           <a:prstGeom prst="rect">
             <a:avLst/>
@@ -4997,6 +5203,12 @@
             <a:noAutofit/>
           </a:bodyPr>
           <a:p>
+            <a:pPr marL="216000" indent="-216000">
+              <a:lnSpc>
+                <a:spcPct val="100000"/>
+              </a:lnSpc>
+              <a:buNone/>
+            </a:pPr>
             <a:r>
               <a:rPr b="0" lang="en-IE" sz="2000" spc="-1" strike="noStrike">
                 <a:latin typeface="Arial"/>
@@ -5008,11 +5220,23 @@
             </a:endParaRPr>
           </a:p>
           <a:p>
+            <a:pPr marL="216000" indent="-216000">
+              <a:lnSpc>
+                <a:spcPct val="100000"/>
+              </a:lnSpc>
+              <a:buNone/>
+            </a:pPr>
             <a:endParaRPr b="0" lang="en-IE" sz="2000" spc="-1" strike="noStrike">
               <a:latin typeface="Arial"/>
             </a:endParaRPr>
           </a:p>
           <a:p>
+            <a:pPr marL="216000" indent="-216000">
+              <a:lnSpc>
+                <a:spcPct val="100000"/>
+              </a:lnSpc>
+              <a:buNone/>
+            </a:pPr>
             <a:r>
               <a:rPr b="0" lang="en-IE" sz="2000" spc="-1" strike="noStrike">
                 <a:latin typeface="Arial"/>
@@ -5020,7 +5244,11 @@
               <a:t>Get Current Trains - usage </a:t>
             </a:r>
             <a:r>
-              <a:rPr b="0" lang="en-IE" sz="2000" spc="-1" strike="noStrike">
+              <a:rPr b="0" lang="en-IE" sz="2000" spc="-1" strike="noStrike" u="sng">
+                <a:solidFill>
+                  <a:srgbClr val="000000"/>
+                </a:solidFill>
+                <a:uFillTx/>
                 <a:latin typeface="Arial"/>
                 <a:hlinkClick r:id="rId1"/>
               </a:rPr>
@@ -5031,13 +5259,29 @@
             </a:endParaRPr>
           </a:p>
           <a:p>
+            <a:pPr marL="216000" indent="-216000">
+              <a:lnSpc>
+                <a:spcPct val="100000"/>
+              </a:lnSpc>
+              <a:buNone/>
+            </a:pPr>
             <a:endParaRPr b="0" lang="en-IE" sz="2000" spc="-1" strike="noStrike">
               <a:latin typeface="Arial"/>
             </a:endParaRPr>
           </a:p>
           <a:p>
-            <a:r>
-              <a:rPr b="0" lang="en-IE" sz="2000" spc="-1" strike="noStrike">
+            <a:pPr marL="216000" indent="-216000">
+              <a:lnSpc>
+                <a:spcPct val="100000"/>
+              </a:lnSpc>
+              <a:buNone/>
+            </a:pPr>
+            <a:r>
+              <a:rPr b="0" lang="en-IE" sz="2000" spc="-1" strike="noStrike" u="sng">
+                <a:solidFill>
+                  <a:srgbClr val="000000"/>
+                </a:solidFill>
+                <a:uFillTx/>
                 <a:latin typeface="Arial"/>
                 <a:hlinkClick r:id="rId2"/>
               </a:rPr>
@@ -5048,8 +5292,18 @@
             </a:endParaRPr>
           </a:p>
           <a:p>
-            <a:r>
-              <a:rPr b="0" lang="en-IE" sz="2000" spc="-1" strike="noStrike">
+            <a:pPr marL="216000" indent="-216000">
+              <a:lnSpc>
+                <a:spcPct val="100000"/>
+              </a:lnSpc>
+              <a:buNone/>
+            </a:pPr>
+            <a:r>
+              <a:rPr b="0" lang="en-IE" sz="2000" spc="-1" strike="noStrike" u="sng">
+                <a:solidFill>
+                  <a:srgbClr val="000000"/>
+                </a:solidFill>
+                <a:uFillTx/>
                 <a:latin typeface="Arial"/>
                 <a:hlinkClick r:id="rId3"/>
               </a:rPr>
@@ -5060,6 +5314,12 @@
             </a:endParaRPr>
           </a:p>
           <a:p>
+            <a:pPr marL="216000" indent="-216000">
+              <a:lnSpc>
+                <a:spcPct val="100000"/>
+              </a:lnSpc>
+              <a:buNone/>
+            </a:pPr>
             <a:endParaRPr b="0" lang="en-IE" sz="2000" spc="-1" strike="noStrike">
               <a:latin typeface="Arial"/>
             </a:endParaRPr>
@@ -5122,7 +5382,7 @@
         <p:txBody>
           <a:bodyPr/>
           <a:p>
-            <a:fld id="{0A426226-806D-455F-A01A-D84B06CEB88D}" type="slidenum">
+            <a:fld id="{7B112985-F150-4DC0-83CD-D941DA768A40}" type="slidenum">
               <a:t>&lt;#&gt;</a:t>
             </a:fld>
           </a:p>
@@ -5310,7 +5570,7 @@
         <p:txBody>
           <a:bodyPr/>
           <a:p>
-            <a:fld id="{C45C2779-04B1-4136-AB2D-1FC0379DE5ED}" type="slidenum">
+            <a:fld id="{30061450-8D5A-40D0-A83F-6543E0002D5D}" type="slidenum">
               <a:t>&lt;#&gt;</a:t>
             </a:fld>
           </a:p>
@@ -5566,7 +5826,7 @@
         <p:txBody>
           <a:bodyPr/>
           <a:p>
-            <a:fld id="{E2255339-7290-4948-AD61-4BA3DF65592D}" type="slidenum">
+            <a:fld id="{3A7AF31F-C8B3-4C2E-AF77-54A5FDD0586F}" type="slidenum">
               <a:t>&lt;#&gt;</a:t>
             </a:fld>
           </a:p>
@@ -5890,7 +6150,7 @@
         <p:txBody>
           <a:bodyPr/>
           <a:p>
-            <a:fld id="{F1A05F83-306C-4A49-88A4-D5AB8DD248EB}" type="slidenum">
+            <a:fld id="{34AB6B0A-49E8-44CB-81FB-9CD2A5AD8493}" type="slidenum">
               <a:t>&lt;#&gt;</a:t>
             </a:fld>
           </a:p>
@@ -5973,7 +6233,7 @@
         <p:txBody>
           <a:bodyPr/>
           <a:p>
-            <a:fld id="{707FBF50-7F51-4B4C-903B-454229B9BEE0}" type="slidenum">
+            <a:fld id="{325DEF2F-E7F4-455B-A3B2-300514BBB04A}" type="slidenum">
               <a:t>&lt;#&gt;</a:t>
             </a:fld>
           </a:p>
@@ -6130,7 +6390,7 @@
         <p:txBody>
           <a:bodyPr/>
           <a:p>
-            <a:fld id="{6CA1AFB9-2D00-40C4-B32D-EABAFEC8B1B3}" type="slidenum">
+            <a:fld id="{8FD2C41A-310C-42E6-B0CD-B034CA8075FE}" type="slidenum">
               <a:t>&lt;#&gt;</a:t>
             </a:fld>
           </a:p>
@@ -6284,7 +6544,7 @@
         <p:txBody>
           <a:bodyPr/>
           <a:p>
-            <a:fld id="{C194A504-F394-4361-A04C-600749A782B4}" type="slidenum">
+            <a:fld id="{5BB6DC11-8E39-488B-8153-599C3FA6642B}" type="slidenum">
               <a:t>&lt;#&gt;</a:t>
             </a:fld>
           </a:p>
@@ -6472,7 +6732,7 @@
         <p:txBody>
           <a:bodyPr/>
           <a:p>
-            <a:fld id="{F4ECA3A6-A9B4-4460-83A6-7EC46029F817}" type="slidenum">
+            <a:fld id="{05A85CE3-684B-4A2B-9524-584BE0B5D13F}" type="slidenum">
               <a:t>&lt;#&gt;</a:t>
             </a:fld>
           </a:p>
@@ -6592,7 +6852,7 @@
         <p:txBody>
           <a:bodyPr/>
           <a:p>
-            <a:fld id="{5BEE63C9-6B97-4BB8-B4CA-4972FC37C9EC}" type="slidenum">
+            <a:fld id="{4E08EA81-2BD9-4F86-A145-2F13148CAB00}" type="slidenum">
               <a:t>&lt;#&gt;</a:t>
             </a:fld>
           </a:p>
@@ -6712,7 +6972,7 @@
         <p:txBody>
           <a:bodyPr/>
           <a:p>
-            <a:fld id="{AF7EB07D-97AF-4579-9768-500484A2479D}" type="slidenum">
+            <a:fld id="{1278F31B-1D53-497C-835D-DC80EA3A1E65}" type="slidenum">
               <a:t>&lt;#&gt;</a:t>
             </a:fld>
           </a:p>
@@ -6934,7 +7194,7 @@
         <p:txBody>
           <a:bodyPr/>
           <a:p>
-            <a:fld id="{3D08ABF0-6A3E-4B30-936C-C73D64C5833D}" type="slidenum">
+            <a:fld id="{1B63B6B0-507B-4B42-BA22-BA28B3732149}" type="slidenum">
               <a:t>&lt;#&gt;</a:t>
             </a:fld>
           </a:p>
@@ -7091,7 +7351,7 @@
         <p:txBody>
           <a:bodyPr/>
           <a:p>
-            <a:fld id="{82E674A0-7803-48D4-A1C2-2672ED425DDD}" type="slidenum">
+            <a:fld id="{72FF5152-9103-4305-9952-0FFD3C6B4195}" type="slidenum">
               <a:t>&lt;#&gt;</a:t>
             </a:fld>
           </a:p>
@@ -7313,7 +7573,7 @@
         <p:txBody>
           <a:bodyPr/>
           <a:p>
-            <a:fld id="{7DEE71A6-445B-4C9D-89D8-18D0BA8017CC}" type="slidenum">
+            <a:fld id="{8B71D8CB-A535-471E-94C6-6EAE65B7B1B1}" type="slidenum">
               <a:t>&lt;#&gt;</a:t>
             </a:fld>
           </a:p>
@@ -7535,7 +7795,7 @@
         <p:txBody>
           <a:bodyPr/>
           <a:p>
-            <a:fld id="{7975C5EA-C01F-499E-B56A-B8B6DC1200A4}" type="slidenum">
+            <a:fld id="{91DEAD4A-CC4D-4B26-957E-A27254CA602D}" type="slidenum">
               <a:t>&lt;#&gt;</a:t>
             </a:fld>
           </a:p>
@@ -7723,7 +7983,7 @@
         <p:txBody>
           <a:bodyPr/>
           <a:p>
-            <a:fld id="{19B074FA-89C9-4109-BC18-6008C149C633}" type="slidenum">
+            <a:fld id="{490C2478-28AE-43C4-B7A0-D087878504AA}" type="slidenum">
               <a:t>&lt;#&gt;</a:t>
             </a:fld>
           </a:p>
@@ -7979,7 +8239,7 @@
         <p:txBody>
           <a:bodyPr/>
           <a:p>
-            <a:fld id="{84B7A453-200D-4C00-B84A-D3D6044A7BEB}" type="slidenum">
+            <a:fld id="{2CC0D39E-318A-4226-922A-956C0BA554CA}" type="slidenum">
               <a:t>&lt;#&gt;</a:t>
             </a:fld>
           </a:p>
@@ -8303,7 +8563,7 @@
         <p:txBody>
           <a:bodyPr/>
           <a:p>
-            <a:fld id="{0DA72902-8E92-4EAE-9D21-F234844F05A2}" type="slidenum">
+            <a:fld id="{2154344F-54ED-4907-B6E7-2CB118AE54B3}" type="slidenum">
               <a:t>&lt;#&gt;</a:t>
             </a:fld>
           </a:p>
@@ -8457,7 +8717,7 @@
         <p:txBody>
           <a:bodyPr/>
           <a:p>
-            <a:fld id="{53AE4689-73CE-47E9-97DF-D8D0AB973A45}" type="slidenum">
+            <a:fld id="{DBA01522-F0EC-41B8-B0F0-B6B8E44DA074}" type="slidenum">
               <a:t>&lt;#&gt;</a:t>
             </a:fld>
           </a:p>
@@ -8645,7 +8905,7 @@
         <p:txBody>
           <a:bodyPr/>
           <a:p>
-            <a:fld id="{2996CDE9-1473-432A-A888-1C8A65261F4A}" type="slidenum">
+            <a:fld id="{52E4F4EA-399B-48CE-9FDD-48517871B2C3}" type="slidenum">
               <a:t>&lt;#&gt;</a:t>
             </a:fld>
           </a:p>
@@ -8765,7 +9025,7 @@
         <p:txBody>
           <a:bodyPr/>
           <a:p>
-            <a:fld id="{24B72A9F-820C-49B3-AD25-C2D6EA74C5B9}" type="slidenum">
+            <a:fld id="{E3BB5F3B-8643-4AE4-B194-F7E7E5A48B3D}" type="slidenum">
               <a:t>&lt;#&gt;</a:t>
             </a:fld>
           </a:p>
@@ -8885,7 +9145,7 @@
         <p:txBody>
           <a:bodyPr/>
           <a:p>
-            <a:fld id="{86301694-77ED-4CCE-94F7-6F967979C3F9}" type="slidenum">
+            <a:fld id="{4515A07A-0D6C-44E0-AFB5-26F82486CE8C}" type="slidenum">
               <a:t>&lt;#&gt;</a:t>
             </a:fld>
           </a:p>
@@ -9107,7 +9367,7 @@
         <p:txBody>
           <a:bodyPr/>
           <a:p>
-            <a:fld id="{8E7675BF-3990-44E1-AB92-8521D70B2A9E}" type="slidenum">
+            <a:fld id="{BF59DA01-545C-4A64-997A-886530626D7F}" type="slidenum">
               <a:t>&lt;#&gt;</a:t>
             </a:fld>
           </a:p>
@@ -9329,7 +9589,7 @@
         <p:txBody>
           <a:bodyPr/>
           <a:p>
-            <a:fld id="{89FD7E5B-89A1-4875-B476-607FE6836F14}" type="slidenum">
+            <a:fld id="{F7F7AAB0-FB15-4D6B-96A2-E847CE862F40}" type="slidenum">
               <a:t>&lt;#&gt;</a:t>
             </a:fld>
           </a:p>
@@ -9551,7 +9811,7 @@
         <p:txBody>
           <a:bodyPr/>
           <a:p>
-            <a:fld id="{956A3BE6-D348-446A-8A26-F4680D3FAAF5}" type="slidenum">
+            <a:fld id="{11CF08E0-CFA2-491E-80F9-EFB3D9DB656B}" type="slidenum">
               <a:t>&lt;#&gt;</a:t>
             </a:fld>
           </a:p>
@@ -9616,9 +9876,9 @@
         <p:grpSpPr>
           <a:xfrm>
             <a:off x="11401560" y="6229800"/>
-            <a:ext cx="456480" cy="456480"/>
+            <a:ext cx="456120" cy="456120"/>
             <a:chOff x="11401560" y="6229800"/>
-            <a:chExt cx="456480" cy="456480"/>
+            <a:chExt cx="456120" cy="456120"/>
           </a:xfrm>
         </p:grpSpPr>
         <p:sp>
@@ -9630,7 +9890,7 @@
           <p:spPr>
             <a:xfrm>
               <a:off x="11401560" y="6229800"/>
-              <a:ext cx="456480" cy="456480"/>
+              <a:ext cx="456120" cy="456120"/>
             </a:xfrm>
             <a:prstGeom prst="ellipse">
               <a:avLst/>
@@ -9660,7 +9920,7 @@
           <p:spPr>
             <a:xfrm>
               <a:off x="11431080" y="6258960"/>
-              <a:ext cx="398160" cy="398160"/>
+              <a:ext cx="397800" cy="397800"/>
             </a:xfrm>
             <a:prstGeom prst="ellipse">
               <a:avLst/>
@@ -9690,7 +9950,7 @@
         <p:spPr>
           <a:xfrm>
             <a:off x="920880" y="1347120"/>
-            <a:ext cx="10222200" cy="79920"/>
+            <a:ext cx="10221840" cy="79560"/>
           </a:xfrm>
           <a:prstGeom prst="rect">
             <a:avLst/>
@@ -9730,7 +9990,7 @@
         <p:spPr>
           <a:xfrm>
             <a:off x="920880" y="4299840"/>
-            <a:ext cx="10222200" cy="79920"/>
+            <a:ext cx="10221840" cy="79560"/>
           </a:xfrm>
           <a:prstGeom prst="rect">
             <a:avLst/>
@@ -9770,7 +10030,7 @@
         <p:spPr>
           <a:xfrm>
             <a:off x="920880" y="1484640"/>
-            <a:ext cx="10222200" cy="2742480"/>
+            <a:ext cx="10221840" cy="2742120"/>
           </a:xfrm>
           <a:prstGeom prst="rect">
             <a:avLst/>
@@ -9810,9 +10070,9 @@
         <p:grpSpPr>
           <a:xfrm>
             <a:off x="9649080" y="4069080"/>
-            <a:ext cx="1080360" cy="1080360"/>
+            <a:ext cx="1080000" cy="1080000"/>
             <a:chOff x="9649080" y="4069080"/>
-            <a:chExt cx="1080360" cy="1080360"/>
+            <a:chExt cx="1080000" cy="1080000"/>
           </a:xfrm>
         </p:grpSpPr>
         <p:sp>
@@ -9824,7 +10084,7 @@
           <p:spPr>
             <a:xfrm>
               <a:off x="9649080" y="4069080"/>
-              <a:ext cx="1080360" cy="1080360"/>
+              <a:ext cx="1080000" cy="1080000"/>
             </a:xfrm>
             <a:prstGeom prst="ellipse">
               <a:avLst/>
@@ -9854,7 +10114,7 @@
           <p:spPr>
             <a:xfrm>
               <a:off x="9757440" y="4177080"/>
-              <a:ext cx="864000" cy="864000"/>
+              <a:ext cx="863640" cy="863640"/>
             </a:xfrm>
             <a:prstGeom prst="ellipse">
               <a:avLst/>
@@ -9887,8 +10147,8 @@
         </p:nvSpPr>
         <p:spPr>
           <a:xfrm>
-            <a:off x="1069920" y="484560"/>
-            <a:ext cx="10057680" cy="1608480"/>
+            <a:off x="609480" y="273600"/>
+            <a:ext cx="10972080" cy="1144440"/>
           </a:xfrm>
           <a:prstGeom prst="rect">
             <a:avLst/>
@@ -9922,13 +10182,196 @@
             <a:spLocks noGrp="1"/>
           </p:cNvSpPr>
           <p:nvPr>
+            <p:ph type="body"/>
+          </p:nvPr>
+        </p:nvSpPr>
+        <p:spPr>
+          <a:xfrm>
+            <a:off x="609480" y="1604520"/>
+            <a:ext cx="10972080" cy="3976920"/>
+          </a:xfrm>
+          <a:prstGeom prst="rect">
+            <a:avLst/>
+          </a:prstGeom>
+          <a:noFill/>
+          <a:ln w="0">
+            <a:noFill/>
+          </a:ln>
+        </p:spPr>
+        <p:txBody>
+          <a:bodyPr lIns="0" rIns="0" tIns="0" bIns="0" anchor="t">
+            <a:normAutofit/>
+          </a:bodyPr>
+          <a:p>
+            <a:pPr marL="432000" indent="-324000">
+              <a:spcBef>
+                <a:spcPts val="1417"/>
+              </a:spcBef>
+              <a:buClr>
+                <a:srgbClr val="000000"/>
+              </a:buClr>
+              <a:buSzPct val="45000"/>
+              <a:buFont typeface="Wingdings" charset="2"/>
+              <a:buChar char=""/>
+            </a:pPr>
+            <a:r>
+              <a:rPr b="0" lang="en-IE" sz="1800" spc="-1" strike="noStrike">
+                <a:latin typeface="Arial"/>
+              </a:rPr>
+              <a:t>Click to edit the outline text format</a:t>
+            </a:r>
+            <a:endParaRPr b="0" lang="en-IE" sz="1800" spc="-1" strike="noStrike">
+              <a:latin typeface="Arial"/>
+            </a:endParaRPr>
+          </a:p>
+          <a:p>
+            <a:pPr lvl="1" marL="864000" indent="-324000">
+              <a:spcBef>
+                <a:spcPts val="1134"/>
+              </a:spcBef>
+              <a:buClr>
+                <a:srgbClr val="000000"/>
+              </a:buClr>
+              <a:buSzPct val="75000"/>
+              <a:buFont typeface="Symbol" charset="2"/>
+              <a:buChar char=""/>
+            </a:pPr>
+            <a:r>
+              <a:rPr b="0" lang="en-IE" sz="1800" spc="-1" strike="noStrike">
+                <a:latin typeface="Arial"/>
+              </a:rPr>
+              <a:t>Second Outline Level</a:t>
+            </a:r>
+            <a:endParaRPr b="0" lang="en-IE" sz="1800" spc="-1" strike="noStrike">
+              <a:latin typeface="Arial"/>
+            </a:endParaRPr>
+          </a:p>
+          <a:p>
+            <a:pPr lvl="2" marL="1296000" indent="-288000">
+              <a:spcBef>
+                <a:spcPts val="850"/>
+              </a:spcBef>
+              <a:buClr>
+                <a:srgbClr val="000000"/>
+              </a:buClr>
+              <a:buSzPct val="45000"/>
+              <a:buFont typeface="Wingdings" charset="2"/>
+              <a:buChar char=""/>
+            </a:pPr>
+            <a:r>
+              <a:rPr b="0" lang="en-IE" sz="1800" spc="-1" strike="noStrike">
+                <a:latin typeface="Arial"/>
+              </a:rPr>
+              <a:t>Third Outline Level</a:t>
+            </a:r>
+            <a:endParaRPr b="0" lang="en-IE" sz="1800" spc="-1" strike="noStrike">
+              <a:latin typeface="Arial"/>
+            </a:endParaRPr>
+          </a:p>
+          <a:p>
+            <a:pPr lvl="3" marL="1728000" indent="-216000">
+              <a:spcBef>
+                <a:spcPts val="567"/>
+              </a:spcBef>
+              <a:buClr>
+                <a:srgbClr val="000000"/>
+              </a:buClr>
+              <a:buSzPct val="75000"/>
+              <a:buFont typeface="Symbol" charset="2"/>
+              <a:buChar char=""/>
+            </a:pPr>
+            <a:r>
+              <a:rPr b="0" lang="en-IE" sz="1800" spc="-1" strike="noStrike">
+                <a:latin typeface="Arial"/>
+              </a:rPr>
+              <a:t>Fourth Outline Level</a:t>
+            </a:r>
+            <a:endParaRPr b="0" lang="en-IE" sz="1800" spc="-1" strike="noStrike">
+              <a:latin typeface="Arial"/>
+            </a:endParaRPr>
+          </a:p>
+          <a:p>
+            <a:pPr lvl="4" marL="2160000" indent="-216000">
+              <a:spcBef>
+                <a:spcPts val="283"/>
+              </a:spcBef>
+              <a:buClr>
+                <a:srgbClr val="000000"/>
+              </a:buClr>
+              <a:buSzPct val="45000"/>
+              <a:buFont typeface="Wingdings" charset="2"/>
+              <a:buChar char=""/>
+            </a:pPr>
+            <a:r>
+              <a:rPr b="0" lang="en-IE" sz="1800" spc="-1" strike="noStrike">
+                <a:latin typeface="Arial"/>
+              </a:rPr>
+              <a:t>Fifth Outline Level</a:t>
+            </a:r>
+            <a:endParaRPr b="0" lang="en-IE" sz="1800" spc="-1" strike="noStrike">
+              <a:latin typeface="Arial"/>
+            </a:endParaRPr>
+          </a:p>
+          <a:p>
+            <a:pPr lvl="5" marL="2592000" indent="-216000">
+              <a:spcBef>
+                <a:spcPts val="283"/>
+              </a:spcBef>
+              <a:buClr>
+                <a:srgbClr val="000000"/>
+              </a:buClr>
+              <a:buSzPct val="45000"/>
+              <a:buFont typeface="Wingdings" charset="2"/>
+              <a:buChar char=""/>
+            </a:pPr>
+            <a:r>
+              <a:rPr b="0" lang="en-IE" sz="1800" spc="-1" strike="noStrike">
+                <a:latin typeface="Arial"/>
+              </a:rPr>
+              <a:t>Sixth Outline Level</a:t>
+            </a:r>
+            <a:endParaRPr b="0" lang="en-IE" sz="1800" spc="-1" strike="noStrike">
+              <a:latin typeface="Arial"/>
+            </a:endParaRPr>
+          </a:p>
+          <a:p>
+            <a:pPr lvl="6" marL="3024000" indent="-216000">
+              <a:spcBef>
+                <a:spcPts val="283"/>
+              </a:spcBef>
+              <a:buClr>
+                <a:srgbClr val="000000"/>
+              </a:buClr>
+              <a:buSzPct val="45000"/>
+              <a:buFont typeface="Wingdings" charset="2"/>
+              <a:buChar char=""/>
+            </a:pPr>
+            <a:r>
+              <a:rPr b="0" lang="en-IE" sz="1800" spc="-1" strike="noStrike">
+                <a:latin typeface="Arial"/>
+              </a:rPr>
+              <a:t>Seventh Outline Level</a:t>
+            </a:r>
+            <a:endParaRPr b="0" lang="en-IE" sz="1800" spc="-1" strike="noStrike">
+              <a:latin typeface="Arial"/>
+            </a:endParaRPr>
+          </a:p>
+        </p:txBody>
+      </p:sp>
+      <p:sp>
+        <p:nvSpPr>
+          <p:cNvPr id="11" name="PlaceHolder 3"/>
+          <p:cNvSpPr>
+            <a:spLocks noGrp="1"/>
+          </p:cNvSpPr>
+          <p:nvPr>
             <p:ph type="ftr" idx="1"/>
           </p:nvPr>
         </p:nvSpPr>
         <p:spPr>
           <a:xfrm>
             <a:off x="1088280" y="6272640"/>
-            <a:ext cx="6327000" cy="364320"/>
+            <a:ext cx="6326640" cy="363960"/>
           </a:xfrm>
           <a:prstGeom prst="rect">
             <a:avLst/>
@@ -9974,7 +10417,7 @@
       </p:sp>
       <p:sp>
         <p:nvSpPr>
-          <p:cNvPr id="11" name="PlaceHolder 3"/>
+          <p:cNvPr id="12" name="PlaceHolder 4"/>
           <p:cNvSpPr>
             <a:spLocks noGrp="1"/>
           </p:cNvSpPr>
@@ -9985,7 +10428,7 @@
         <p:spPr>
           <a:xfrm>
             <a:off x="9592560" y="4289400"/>
-            <a:ext cx="1193040" cy="639360"/>
+            <a:ext cx="1192680" cy="639000"/>
           </a:xfrm>
           <a:prstGeom prst="rect">
             <a:avLst/>
@@ -10020,7 +10463,7 @@
               </a:lnSpc>
               <a:buNone/>
             </a:pPr>
-            <a:fld id="{E7F9139C-05AC-480E-8F3F-F5D9F40E53DC}" type="slidenum">
+            <a:fld id="{48B42534-70B3-4989-A582-76E232989EE7}" type="slidenum">
               <a:rPr b="1" lang="en-US" sz="2800" spc="-1" strike="noStrike">
                 <a:solidFill>
                   <a:srgbClr val="ffffff"/>
@@ -10037,7 +10480,7 @@
       </p:sp>
       <p:sp>
         <p:nvSpPr>
-          <p:cNvPr id="12" name="PlaceHolder 4"/>
+          <p:cNvPr id="13" name="PlaceHolder 5"/>
           <p:cNvSpPr>
             <a:spLocks noGrp="1"/>
           </p:cNvSpPr>
@@ -10048,7 +10491,7 @@
         <p:spPr>
           <a:xfrm>
             <a:off x="7964280" y="6272640"/>
-            <a:ext cx="3272760" cy="364320"/>
+            <a:ext cx="3272400" cy="363960"/>
           </a:xfrm>
           <a:prstGeom prst="rect">
             <a:avLst/>
@@ -10078,189 +10521,6 @@
             </a:r>
             <a:endParaRPr b="0" lang="en-IE" sz="1400" spc="-1" strike="noStrike">
               <a:latin typeface="Times New Roman"/>
-            </a:endParaRPr>
-          </a:p>
-        </p:txBody>
-      </p:sp>
-      <p:sp>
-        <p:nvSpPr>
-          <p:cNvPr id="13" name="PlaceHolder 5"/>
-          <p:cNvSpPr>
-            <a:spLocks noGrp="1"/>
-          </p:cNvSpPr>
-          <p:nvPr>
-            <p:ph type="body"/>
-          </p:nvPr>
-        </p:nvSpPr>
-        <p:spPr>
-          <a:xfrm>
-            <a:off x="609480" y="1604520"/>
-            <a:ext cx="10972440" cy="3977280"/>
-          </a:xfrm>
-          <a:prstGeom prst="rect">
-            <a:avLst/>
-          </a:prstGeom>
-          <a:noFill/>
-          <a:ln w="0">
-            <a:noFill/>
-          </a:ln>
-        </p:spPr>
-        <p:txBody>
-          <a:bodyPr lIns="0" rIns="0" tIns="0" bIns="0" anchor="t">
-            <a:normAutofit/>
-          </a:bodyPr>
-          <a:p>
-            <a:pPr marL="432000" indent="-324000">
-              <a:spcBef>
-                <a:spcPts val="1417"/>
-              </a:spcBef>
-              <a:buClr>
-                <a:srgbClr val="000000"/>
-              </a:buClr>
-              <a:buSzPct val="45000"/>
-              <a:buFont typeface="Wingdings" charset="2"/>
-              <a:buChar char=""/>
-            </a:pPr>
-            <a:r>
-              <a:rPr b="0" lang="en-IE" sz="3200" spc="-1" strike="noStrike">
-                <a:latin typeface="Arial"/>
-              </a:rPr>
-              <a:t>Click to edit the outline text format</a:t>
-            </a:r>
-            <a:endParaRPr b="0" lang="en-IE" sz="3200" spc="-1" strike="noStrike">
-              <a:latin typeface="Arial"/>
-            </a:endParaRPr>
-          </a:p>
-          <a:p>
-            <a:pPr lvl="1" marL="864000" indent="-324000">
-              <a:spcBef>
-                <a:spcPts val="1134"/>
-              </a:spcBef>
-              <a:buClr>
-                <a:srgbClr val="000000"/>
-              </a:buClr>
-              <a:buSzPct val="75000"/>
-              <a:buFont typeface="Symbol" charset="2"/>
-              <a:buChar char=""/>
-            </a:pPr>
-            <a:r>
-              <a:rPr b="0" lang="en-IE" sz="2800" spc="-1" strike="noStrike">
-                <a:latin typeface="Arial"/>
-              </a:rPr>
-              <a:t>Second Outline Level</a:t>
-            </a:r>
-            <a:endParaRPr b="0" lang="en-IE" sz="2800" spc="-1" strike="noStrike">
-              <a:latin typeface="Arial"/>
-            </a:endParaRPr>
-          </a:p>
-          <a:p>
-            <a:pPr lvl="2" marL="1296000" indent="-288000">
-              <a:spcBef>
-                <a:spcPts val="850"/>
-              </a:spcBef>
-              <a:buClr>
-                <a:srgbClr val="000000"/>
-              </a:buClr>
-              <a:buSzPct val="45000"/>
-              <a:buFont typeface="Wingdings" charset="2"/>
-              <a:buChar char=""/>
-            </a:pPr>
-            <a:r>
-              <a:rPr b="0" lang="en-IE" sz="2400" spc="-1" strike="noStrike">
-                <a:latin typeface="Arial"/>
-              </a:rPr>
-              <a:t>Third Outline Level</a:t>
-            </a:r>
-            <a:endParaRPr b="0" lang="en-IE" sz="2400" spc="-1" strike="noStrike">
-              <a:latin typeface="Arial"/>
-            </a:endParaRPr>
-          </a:p>
-          <a:p>
-            <a:pPr lvl="3" marL="1728000" indent="-216000">
-              <a:spcBef>
-                <a:spcPts val="567"/>
-              </a:spcBef>
-              <a:buClr>
-                <a:srgbClr val="000000"/>
-              </a:buClr>
-              <a:buSzPct val="75000"/>
-              <a:buFont typeface="Symbol" charset="2"/>
-              <a:buChar char=""/>
-            </a:pPr>
-            <a:r>
-              <a:rPr b="0" lang="en-IE" sz="2000" spc="-1" strike="noStrike">
-                <a:latin typeface="Arial"/>
-              </a:rPr>
-              <a:t>Fourth Outline Level</a:t>
-            </a:r>
-            <a:endParaRPr b="0" lang="en-IE" sz="2000" spc="-1" strike="noStrike">
-              <a:latin typeface="Arial"/>
-            </a:endParaRPr>
-          </a:p>
-          <a:p>
-            <a:pPr lvl="4" marL="2160000" indent="-216000">
-              <a:spcBef>
-                <a:spcPts val="283"/>
-              </a:spcBef>
-              <a:buClr>
-                <a:srgbClr val="000000"/>
-              </a:buClr>
-              <a:buSzPct val="45000"/>
-              <a:buFont typeface="Wingdings" charset="2"/>
-              <a:buChar char=""/>
-            </a:pPr>
-            <a:r>
-              <a:rPr b="0" lang="en-IE" sz="2000" spc="-1" strike="noStrike">
-                <a:latin typeface="Arial"/>
-              </a:rPr>
-              <a:t>Fifth Outline Level</a:t>
-            </a:r>
-            <a:endParaRPr b="0" lang="en-IE" sz="2000" spc="-1" strike="noStrike">
-              <a:latin typeface="Arial"/>
-            </a:endParaRPr>
-          </a:p>
-          <a:p>
-            <a:pPr lvl="5" marL="2592000" indent="-216000">
-              <a:spcBef>
-                <a:spcPts val="283"/>
-              </a:spcBef>
-              <a:buClr>
-                <a:srgbClr val="000000"/>
-              </a:buClr>
-              <a:buSzPct val="45000"/>
-              <a:buFont typeface="Wingdings" charset="2"/>
-              <a:buChar char=""/>
-            </a:pPr>
-            <a:r>
-              <a:rPr b="0" lang="en-IE" sz="2000" spc="-1" strike="noStrike">
-                <a:latin typeface="Arial"/>
-              </a:rPr>
-              <a:t>Sixth Outline Level</a:t>
-            </a:r>
-            <a:endParaRPr b="0" lang="en-IE" sz="2000" spc="-1" strike="noStrike">
-              <a:latin typeface="Arial"/>
-            </a:endParaRPr>
-          </a:p>
-          <a:p>
-            <a:pPr lvl="6" marL="3024000" indent="-216000">
-              <a:spcBef>
-                <a:spcPts val="283"/>
-              </a:spcBef>
-              <a:buClr>
-                <a:srgbClr val="000000"/>
-              </a:buClr>
-              <a:buSzPct val="45000"/>
-              <a:buFont typeface="Wingdings" charset="2"/>
-              <a:buChar char=""/>
-            </a:pPr>
-            <a:r>
-              <a:rPr b="0" lang="en-IE" sz="2000" spc="-1" strike="noStrike">
-                <a:latin typeface="Arial"/>
-              </a:rPr>
-              <a:t>Seventh Outline Level</a:t>
-            </a:r>
-            <a:endParaRPr b="0" lang="en-IE" sz="2000" spc="-1" strike="noStrike">
-              <a:latin typeface="Arial"/>
             </a:endParaRPr>
           </a:p>
         </p:txBody>
@@ -10318,9 +10578,9 @@
         <p:grpSpPr>
           <a:xfrm>
             <a:off x="11401560" y="6229800"/>
-            <a:ext cx="456480" cy="456480"/>
+            <a:ext cx="456120" cy="456120"/>
             <a:chOff x="11401560" y="6229800"/>
-            <a:chExt cx="456480" cy="456480"/>
+            <a:chExt cx="456120" cy="456120"/>
           </a:xfrm>
         </p:grpSpPr>
         <p:sp>
@@ -10332,7 +10592,7 @@
           <p:spPr>
             <a:xfrm>
               <a:off x="11401560" y="6229800"/>
-              <a:ext cx="456480" cy="456480"/>
+              <a:ext cx="456120" cy="456120"/>
             </a:xfrm>
             <a:prstGeom prst="ellipse">
               <a:avLst/>
@@ -10362,7 +10622,7 @@
           <p:spPr>
             <a:xfrm>
               <a:off x="11431080" y="6258960"/>
-              <a:ext cx="398160" cy="398160"/>
+              <a:ext cx="397800" cy="397800"/>
             </a:xfrm>
             <a:prstGeom prst="ellipse">
               <a:avLst/>
@@ -10396,7 +10656,7 @@
         <p:spPr>
           <a:xfrm>
             <a:off x="1088280" y="6272640"/>
-            <a:ext cx="6327000" cy="364320"/>
+            <a:ext cx="6326640" cy="363960"/>
           </a:xfrm>
           <a:prstGeom prst="rect">
             <a:avLst/>
@@ -10453,7 +10713,7 @@
         <p:spPr>
           <a:xfrm>
             <a:off x="11311200" y="6272640"/>
-            <a:ext cx="639360" cy="364320"/>
+            <a:ext cx="639000" cy="363960"/>
           </a:xfrm>
           <a:prstGeom prst="rect">
             <a:avLst/>
@@ -10488,7 +10748,7 @@
               </a:lnSpc>
               <a:buNone/>
             </a:pPr>
-            <a:fld id="{CD8F186E-EAB4-4E42-A84B-3E97C1BFA8F3}" type="slidenum">
+            <a:fld id="{BC2A5C46-7C1B-4CEF-AC8D-847EBD2A81FE}" type="slidenum">
               <a:rPr b="1" lang="en-US" sz="1400" spc="-1" strike="noStrike">
                 <a:solidFill>
                   <a:srgbClr val="ffffff"/>
@@ -10516,7 +10776,7 @@
         <p:spPr>
           <a:xfrm>
             <a:off x="7964280" y="6272640"/>
-            <a:ext cx="3272760" cy="364320"/>
+            <a:ext cx="3272400" cy="363960"/>
           </a:xfrm>
           <a:prstGeom prst="rect">
             <a:avLst/>
@@ -10826,7 +11086,7 @@
         <p:spPr>
           <a:xfrm>
             <a:off x="1051560" y="1432080"/>
-            <a:ext cx="9966240" cy="3035160"/>
+            <a:ext cx="9965880" cy="3034800"/>
           </a:xfrm>
           <a:prstGeom prst="rect">
             <a:avLst/>
@@ -10872,7 +11132,7 @@
         <p:spPr>
           <a:xfrm>
             <a:off x="1051560" y="4467960"/>
-            <a:ext cx="7890480" cy="699840"/>
+            <a:ext cx="7890120" cy="699480"/>
           </a:xfrm>
           <a:prstGeom prst="rect">
             <a:avLst/>
@@ -10983,7 +11243,7 @@
         <p:spPr>
           <a:xfrm>
             <a:off x="1069920" y="484560"/>
-            <a:ext cx="10057680" cy="1360800"/>
+            <a:ext cx="10057320" cy="1360440"/>
           </a:xfrm>
           <a:prstGeom prst="rect">
             <a:avLst/>
@@ -11029,7 +11289,7 @@
         <p:spPr>
           <a:xfrm>
             <a:off x="1063800" y="1621080"/>
-            <a:ext cx="10057680" cy="4613760"/>
+            <a:ext cx="10057320" cy="4613400"/>
           </a:xfrm>
           <a:prstGeom prst="rect">
             <a:avLst/>
@@ -12299,9 +12559,9 @@
         <p:grpSpPr>
           <a:xfrm>
             <a:off x="11401560" y="6229800"/>
-            <a:ext cx="456480" cy="456480"/>
+            <a:ext cx="456120" cy="456120"/>
             <a:chOff x="11401560" y="6229800"/>
-            <a:chExt cx="456480" cy="456480"/>
+            <a:chExt cx="456120" cy="456120"/>
           </a:xfrm>
         </p:grpSpPr>
         <p:sp>
@@ -12313,7 +12573,7 @@
           <p:spPr>
             <a:xfrm>
               <a:off x="11401560" y="6229800"/>
-              <a:ext cx="456480" cy="456480"/>
+              <a:ext cx="456120" cy="456120"/>
             </a:xfrm>
             <a:prstGeom prst="ellipse">
               <a:avLst/>
@@ -12343,7 +12603,7 @@
           <p:spPr>
             <a:xfrm>
               <a:off x="11431080" y="6258960"/>
-              <a:ext cx="398160" cy="398160"/>
+              <a:ext cx="397800" cy="397800"/>
             </a:xfrm>
             <a:prstGeom prst="ellipse">
               <a:avLst/>
@@ -12373,7 +12633,7 @@
         <p:spPr>
           <a:xfrm>
             <a:off x="0" y="0"/>
-            <a:ext cx="12191400" cy="6857280"/>
+            <a:ext cx="12191040" cy="6856920"/>
           </a:xfrm>
           <a:prstGeom prst="rect">
             <a:avLst/>
@@ -12409,7 +12669,7 @@
         <p:spPr>
           <a:xfrm>
             <a:off x="0" y="0"/>
-            <a:ext cx="12191400" cy="6857280"/>
+            <a:ext cx="12191040" cy="6856920"/>
           </a:xfrm>
           <a:prstGeom prst="rect">
             <a:avLst/>
@@ -12449,7 +12709,7 @@
         <p:spPr>
           <a:xfrm>
             <a:off x="477000" y="480240"/>
-            <a:ext cx="11237400" cy="5897160"/>
+            <a:ext cx="11237040" cy="5896800"/>
           </a:xfrm>
           <a:prstGeom prst="rect">
             <a:avLst/>
@@ -14619,7 +14879,7 @@
         <p:spPr>
           <a:xfrm>
             <a:off x="3107160" y="800640"/>
-            <a:ext cx="6094080" cy="942840"/>
+            <a:ext cx="6093720" cy="942840"/>
           </a:xfrm>
           <a:prstGeom prst="rect">
             <a:avLst/>
@@ -14705,7 +14965,7 @@
         <p:spPr>
           <a:xfrm>
             <a:off x="1069920" y="484560"/>
-            <a:ext cx="10057680" cy="1608480"/>
+            <a:ext cx="10057320" cy="1608120"/>
           </a:xfrm>
           <a:prstGeom prst="rect">
             <a:avLst/>
@@ -14751,7 +15011,7 @@
         <p:spPr>
           <a:xfrm>
             <a:off x="1069920" y="2121480"/>
-            <a:ext cx="10057680" cy="4050000"/>
+            <a:ext cx="10057320" cy="4049640"/>
           </a:xfrm>
           <a:prstGeom prst="rect">
             <a:avLst/>
@@ -18769,7 +19029,7 @@
         <p:spPr>
           <a:xfrm>
             <a:off x="1069920" y="484560"/>
-            <a:ext cx="10057680" cy="1608480"/>
+            <a:ext cx="10057320" cy="1608120"/>
           </a:xfrm>
           <a:prstGeom prst="rect">
             <a:avLst/>
@@ -18815,7 +19075,7 @@
         <p:spPr>
           <a:xfrm>
             <a:off x="1069920" y="1863360"/>
-            <a:ext cx="10057680" cy="4308120"/>
+            <a:ext cx="10057320" cy="4307760"/>
           </a:xfrm>
           <a:prstGeom prst="rect">
             <a:avLst/>
@@ -19546,7 +19806,7 @@
         <p:spPr>
           <a:xfrm>
             <a:off x="966240" y="2426400"/>
-            <a:ext cx="10057680" cy="1608480"/>
+            <a:ext cx="10057320" cy="1608120"/>
           </a:xfrm>
           <a:prstGeom prst="rect">
             <a:avLst/>
@@ -19634,7 +19894,7 @@
         <p:spPr>
           <a:xfrm>
             <a:off x="0" y="0"/>
-            <a:ext cx="12191400" cy="6857280"/>
+            <a:ext cx="12191040" cy="6856920"/>
           </a:xfrm>
           <a:prstGeom prst="rect">
             <a:avLst/>
@@ -19670,7 +19930,7 @@
         <p:spPr>
           <a:xfrm>
             <a:off x="984600" y="464040"/>
-            <a:ext cx="10222200" cy="79920"/>
+            <a:ext cx="10221840" cy="79560"/>
           </a:xfrm>
           <a:prstGeom prst="rect">
             <a:avLst/>
@@ -19710,7 +19970,7 @@
         <p:spPr>
           <a:xfrm>
             <a:off x="984600" y="601920"/>
-            <a:ext cx="10222200" cy="1385280"/>
+            <a:ext cx="10221840" cy="1384920"/>
           </a:xfrm>
           <a:prstGeom prst="rect">
             <a:avLst/>
@@ -19750,7 +20010,7 @@
         <p:spPr>
           <a:xfrm>
             <a:off x="984600" y="2038680"/>
-            <a:ext cx="10222200" cy="79920"/>
+            <a:ext cx="10221840" cy="79560"/>
           </a:xfrm>
           <a:prstGeom prst="rect">
             <a:avLst/>
@@ -19794,7 +20054,7 @@
         <p:spPr>
           <a:xfrm>
             <a:off x="1069920" y="484560"/>
-            <a:ext cx="10057680" cy="1608480"/>
+            <a:ext cx="10057320" cy="1608120"/>
           </a:xfrm>
           <a:prstGeom prst="rect">
             <a:avLst/>
@@ -19840,7 +20100,7 @@
         <p:spPr>
           <a:xfrm>
             <a:off x="1069920" y="2320560"/>
-            <a:ext cx="10057680" cy="3850920"/>
+            <a:ext cx="10057320" cy="3850560"/>
           </a:xfrm>
           <a:prstGeom prst="rect">
             <a:avLst/>
@@ -20270,7 +20530,7 @@
         <p:spPr>
           <a:xfrm>
             <a:off x="11401560" y="6229800"/>
-            <a:ext cx="456480" cy="456480"/>
+            <a:ext cx="456120" cy="456120"/>
           </a:xfrm>
           <a:prstGeom prst="ellipse">
             <a:avLst/>
@@ -20300,7 +20560,7 @@
         <p:spPr>
           <a:xfrm>
             <a:off x="11431080" y="6258960"/>
-            <a:ext cx="398160" cy="398160"/>
+            <a:ext cx="397800" cy="397800"/>
           </a:xfrm>
           <a:prstGeom prst="ellipse">
             <a:avLst/>
@@ -20366,7 +20626,7 @@
         <p:spPr>
           <a:xfrm>
             <a:off x="920880" y="1347120"/>
-            <a:ext cx="10222200" cy="79920"/>
+            <a:ext cx="10221840" cy="79560"/>
           </a:xfrm>
           <a:prstGeom prst="rect">
             <a:avLst/>
@@ -20406,7 +20666,7 @@
         <p:spPr>
           <a:xfrm>
             <a:off x="920880" y="4299840"/>
-            <a:ext cx="10222200" cy="79920"/>
+            <a:ext cx="10221840" cy="79560"/>
           </a:xfrm>
           <a:prstGeom prst="rect">
             <a:avLst/>
@@ -20446,7 +20706,7 @@
         <p:spPr>
           <a:xfrm>
             <a:off x="920880" y="1484640"/>
-            <a:ext cx="10222200" cy="2742480"/>
+            <a:ext cx="10221840" cy="2742120"/>
           </a:xfrm>
           <a:prstGeom prst="rect">
             <a:avLst/>
@@ -20486,9 +20746,9 @@
         <p:grpSpPr>
           <a:xfrm>
             <a:off x="9649080" y="4069080"/>
-            <a:ext cx="1080360" cy="1080360"/>
+            <a:ext cx="1080000" cy="1080000"/>
             <a:chOff x="9649080" y="4069080"/>
-            <a:chExt cx="1080360" cy="1080360"/>
+            <a:chExt cx="1080000" cy="1080000"/>
           </a:xfrm>
         </p:grpSpPr>
         <p:sp>
@@ -20500,7 +20760,7 @@
           <p:spPr>
             <a:xfrm>
               <a:off x="9649080" y="4069080"/>
-              <a:ext cx="1080360" cy="1080360"/>
+              <a:ext cx="1080000" cy="1080000"/>
             </a:xfrm>
             <a:prstGeom prst="ellipse">
               <a:avLst/>
@@ -20530,7 +20790,7 @@
           <p:spPr>
             <a:xfrm>
               <a:off x="9757440" y="4177080"/>
-              <a:ext cx="864000" cy="864000"/>
+              <a:ext cx="863640" cy="863640"/>
             </a:xfrm>
             <a:prstGeom prst="ellipse">
               <a:avLst/>
@@ -20560,7 +20820,7 @@
         <p:spPr>
           <a:xfrm>
             <a:off x="0" y="0"/>
-            <a:ext cx="12188160" cy="6857280"/>
+            <a:ext cx="12187800" cy="6856920"/>
           </a:xfrm>
           <a:prstGeom prst="rect">
             <a:avLst/>
@@ -20596,7 +20856,7 @@
         <p:spPr>
           <a:xfrm>
             <a:off x="0" y="4257360"/>
-            <a:ext cx="12191400" cy="2609640"/>
+            <a:ext cx="12191040" cy="2609280"/>
           </a:xfrm>
           <a:prstGeom prst="rect">
             <a:avLst/>
@@ -20640,7 +20900,7 @@
         <p:spPr>
           <a:xfrm>
             <a:off x="1051560" y="4355640"/>
-            <a:ext cx="9085320" cy="1471680"/>
+            <a:ext cx="9084960" cy="1471320"/>
           </a:xfrm>
           <a:prstGeom prst="rect">
             <a:avLst/>
@@ -20686,7 +20946,7 @@
         <p:spPr>
           <a:xfrm>
             <a:off x="635400" y="999720"/>
-            <a:ext cx="10915920" cy="2955960"/>
+            <a:ext cx="10915560" cy="2955600"/>
           </a:xfrm>
           <a:prstGeom prst="rect">
             <a:avLst/>
@@ -20705,9 +20965,9 @@
         <p:grpSpPr>
           <a:xfrm>
             <a:off x="10245600" y="5111640"/>
-            <a:ext cx="1080360" cy="1080360"/>
+            <a:ext cx="1080000" cy="1080000"/>
             <a:chOff x="10245600" y="5111640"/>
-            <a:chExt cx="1080360" cy="1080360"/>
+            <a:chExt cx="1080000" cy="1080000"/>
           </a:xfrm>
         </p:grpSpPr>
         <p:sp>
@@ -20719,7 +20979,7 @@
           <p:spPr>
             <a:xfrm>
               <a:off x="10245600" y="5111640"/>
-              <a:ext cx="1080360" cy="1080360"/>
+              <a:ext cx="1080000" cy="1080000"/>
             </a:xfrm>
             <a:prstGeom prst="ellipse">
               <a:avLst/>
@@ -20749,7 +21009,7 @@
           <p:spPr>
             <a:xfrm>
               <a:off x="10353600" y="5219640"/>
-              <a:ext cx="864000" cy="864000"/>
+              <a:ext cx="863640" cy="863640"/>
             </a:xfrm>
             <a:prstGeom prst="ellipse">
               <a:avLst/>
@@ -20816,7 +21076,7 @@
         <p:spPr>
           <a:xfrm>
             <a:off x="920880" y="1347120"/>
-            <a:ext cx="10222200" cy="79920"/>
+            <a:ext cx="10221840" cy="79560"/>
           </a:xfrm>
           <a:prstGeom prst="rect">
             <a:avLst/>
@@ -20856,7 +21116,7 @@
         <p:spPr>
           <a:xfrm>
             <a:off x="920880" y="4299840"/>
-            <a:ext cx="10222200" cy="79920"/>
+            <a:ext cx="10221840" cy="79560"/>
           </a:xfrm>
           <a:prstGeom prst="rect">
             <a:avLst/>
@@ -20896,7 +21156,7 @@
         <p:spPr>
           <a:xfrm>
             <a:off x="920880" y="1484640"/>
-            <a:ext cx="10222200" cy="2742480"/>
+            <a:ext cx="10221840" cy="2742120"/>
           </a:xfrm>
           <a:prstGeom prst="rect">
             <a:avLst/>
@@ -20936,9 +21196,9 @@
         <p:grpSpPr>
           <a:xfrm>
             <a:off x="9649080" y="4069080"/>
-            <a:ext cx="1080360" cy="1080360"/>
+            <a:ext cx="1080000" cy="1080000"/>
             <a:chOff x="9649080" y="4069080"/>
-            <a:chExt cx="1080360" cy="1080360"/>
+            <a:chExt cx="1080000" cy="1080000"/>
           </a:xfrm>
         </p:grpSpPr>
         <p:sp>
@@ -20950,7 +21210,7 @@
           <p:spPr>
             <a:xfrm>
               <a:off x="9649080" y="4069080"/>
-              <a:ext cx="1080360" cy="1080360"/>
+              <a:ext cx="1080000" cy="1080000"/>
             </a:xfrm>
             <a:prstGeom prst="ellipse">
               <a:avLst/>
@@ -20980,7 +21240,7 @@
           <p:spPr>
             <a:xfrm>
               <a:off x="9757440" y="4177080"/>
-              <a:ext cx="864000" cy="864000"/>
+              <a:ext cx="863640" cy="863640"/>
             </a:xfrm>
             <a:prstGeom prst="ellipse">
               <a:avLst/>
@@ -21010,7 +21270,7 @@
         <p:spPr>
           <a:xfrm>
             <a:off x="0" y="0"/>
-            <a:ext cx="12188160" cy="6857280"/>
+            <a:ext cx="12187800" cy="6856920"/>
           </a:xfrm>
           <a:prstGeom prst="rect">
             <a:avLst/>
@@ -21046,7 +21306,7 @@
         <p:spPr>
           <a:xfrm>
             <a:off x="920880" y="928080"/>
-            <a:ext cx="10350360" cy="79920"/>
+            <a:ext cx="10350000" cy="79560"/>
           </a:xfrm>
           <a:prstGeom prst="rect">
             <a:avLst/>
@@ -21086,7 +21346,7 @@
         <p:spPr>
           <a:xfrm>
             <a:off x="7885440" y="1109880"/>
-            <a:ext cx="3385800" cy="4579560"/>
+            <a:ext cx="3385440" cy="4579200"/>
           </a:xfrm>
           <a:prstGeom prst="rect">
             <a:avLst/>
@@ -21130,7 +21390,7 @@
         <p:spPr>
           <a:xfrm>
             <a:off x="8200080" y="1432080"/>
-            <a:ext cx="2817720" cy="3357360"/>
+            <a:ext cx="2817360" cy="3357000"/>
           </a:xfrm>
           <a:prstGeom prst="rect">
             <a:avLst/>
@@ -21172,7 +21432,7 @@
         <p:spPr>
           <a:xfrm>
             <a:off x="920880" y="5780520"/>
-            <a:ext cx="10350360" cy="79920"/>
+            <a:ext cx="10350000" cy="79560"/>
           </a:xfrm>
           <a:prstGeom prst="rect">
             <a:avLst/>
@@ -21212,9 +21472,9 @@
         <p:grpSpPr>
           <a:xfrm>
             <a:off x="9646920" y="5257800"/>
-            <a:ext cx="1080360" cy="1080360"/>
+            <a:ext cx="1080000" cy="1080000"/>
             <a:chOff x="9646920" y="5257800"/>
-            <a:chExt cx="1080360" cy="1080360"/>
+            <a:chExt cx="1080000" cy="1080000"/>
           </a:xfrm>
         </p:grpSpPr>
         <p:sp>
@@ -21226,7 +21486,7 @@
           <p:spPr>
             <a:xfrm>
               <a:off x="9646920" y="5257800"/>
-              <a:ext cx="1080360" cy="1080360"/>
+              <a:ext cx="1080000" cy="1080000"/>
             </a:xfrm>
             <a:prstGeom prst="ellipse">
               <a:avLst/>
@@ -21256,7 +21516,7 @@
           <p:spPr>
             <a:xfrm>
               <a:off x="9754920" y="5365800"/>
-              <a:ext cx="864000" cy="864000"/>
+              <a:ext cx="863640" cy="863640"/>
             </a:xfrm>
             <a:prstGeom prst="ellipse">
               <a:avLst/>
@@ -21290,7 +21550,7 @@
         <p:spPr>
           <a:xfrm>
             <a:off x="141840" y="504720"/>
-            <a:ext cx="7686360" cy="5424480"/>
+            <a:ext cx="7686000" cy="5424120"/>
           </a:xfrm>
           <a:prstGeom prst="rect">
             <a:avLst/>
@@ -21346,7 +21606,7 @@
         <p:spPr>
           <a:xfrm>
             <a:off x="920880" y="1347120"/>
-            <a:ext cx="10222200" cy="79920"/>
+            <a:ext cx="10221840" cy="79560"/>
           </a:xfrm>
           <a:prstGeom prst="rect">
             <a:avLst/>
@@ -21386,7 +21646,7 @@
         <p:spPr>
           <a:xfrm>
             <a:off x="920880" y="4299840"/>
-            <a:ext cx="10222200" cy="79920"/>
+            <a:ext cx="10221840" cy="79560"/>
           </a:xfrm>
           <a:prstGeom prst="rect">
             <a:avLst/>
@@ -21426,7 +21686,7 @@
         <p:spPr>
           <a:xfrm>
             <a:off x="920880" y="1484640"/>
-            <a:ext cx="10222200" cy="2742480"/>
+            <a:ext cx="10221840" cy="2742120"/>
           </a:xfrm>
           <a:prstGeom prst="rect">
             <a:avLst/>
@@ -21466,9 +21726,9 @@
         <p:grpSpPr>
           <a:xfrm>
             <a:off x="9649080" y="4069080"/>
-            <a:ext cx="1080360" cy="1080360"/>
+            <a:ext cx="1080000" cy="1080000"/>
             <a:chOff x="9649080" y="4069080"/>
-            <a:chExt cx="1080360" cy="1080360"/>
+            <a:chExt cx="1080000" cy="1080000"/>
           </a:xfrm>
         </p:grpSpPr>
         <p:sp>
@@ -21480,7 +21740,7 @@
           <p:spPr>
             <a:xfrm>
               <a:off x="9649080" y="4069080"/>
-              <a:ext cx="1080360" cy="1080360"/>
+              <a:ext cx="1080000" cy="1080000"/>
             </a:xfrm>
             <a:prstGeom prst="ellipse">
               <a:avLst/>
@@ -21510,7 +21770,7 @@
           <p:spPr>
             <a:xfrm>
               <a:off x="9757440" y="4177080"/>
-              <a:ext cx="864000" cy="864000"/>
+              <a:ext cx="863640" cy="863640"/>
             </a:xfrm>
             <a:prstGeom prst="ellipse">
               <a:avLst/>
@@ -21540,7 +21800,7 @@
         <p:spPr>
           <a:xfrm>
             <a:off x="0" y="0"/>
-            <a:ext cx="12188160" cy="6857280"/>
+            <a:ext cx="12187800" cy="6856920"/>
           </a:xfrm>
           <a:prstGeom prst="rect">
             <a:avLst/>
@@ -21576,7 +21836,7 @@
         <p:spPr>
           <a:xfrm>
             <a:off x="920880" y="928080"/>
-            <a:ext cx="10350360" cy="79920"/>
+            <a:ext cx="10350000" cy="79560"/>
           </a:xfrm>
           <a:prstGeom prst="rect">
             <a:avLst/>
@@ -21616,7 +21876,7 @@
         <p:spPr>
           <a:xfrm>
             <a:off x="7885440" y="1109880"/>
-            <a:ext cx="3385800" cy="4579560"/>
+            <a:ext cx="3385440" cy="4579200"/>
           </a:xfrm>
           <a:prstGeom prst="rect">
             <a:avLst/>
@@ -21660,7 +21920,7 @@
         <p:spPr>
           <a:xfrm>
             <a:off x="8200080" y="1432080"/>
-            <a:ext cx="2817720" cy="3357360"/>
+            <a:ext cx="2817360" cy="3357000"/>
           </a:xfrm>
           <a:prstGeom prst="rect">
             <a:avLst/>
@@ -21702,7 +21962,7 @@
         <p:spPr>
           <a:xfrm>
             <a:off x="920880" y="5780520"/>
-            <a:ext cx="10350360" cy="79920"/>
+            <a:ext cx="10350000" cy="79560"/>
           </a:xfrm>
           <a:prstGeom prst="rect">
             <a:avLst/>
@@ -21742,9 +22002,9 @@
         <p:grpSpPr>
           <a:xfrm>
             <a:off x="9646920" y="5257800"/>
-            <a:ext cx="1080360" cy="1080360"/>
+            <a:ext cx="1080000" cy="1080000"/>
             <a:chOff x="9646920" y="5257800"/>
-            <a:chExt cx="1080360" cy="1080360"/>
+            <a:chExt cx="1080000" cy="1080000"/>
           </a:xfrm>
         </p:grpSpPr>
         <p:sp>
@@ -21756,7 +22016,7 @@
           <p:spPr>
             <a:xfrm>
               <a:off x="9646920" y="5257800"/>
-              <a:ext cx="1080360" cy="1080360"/>
+              <a:ext cx="1080000" cy="1080000"/>
             </a:xfrm>
             <a:prstGeom prst="ellipse">
               <a:avLst/>
@@ -21786,7 +22046,7 @@
           <p:spPr>
             <a:xfrm>
               <a:off x="9754920" y="5365800"/>
-              <a:ext cx="864000" cy="864000"/>
+              <a:ext cx="863640" cy="863640"/>
             </a:xfrm>
             <a:prstGeom prst="ellipse">
               <a:avLst/>
@@ -21820,7 +22080,7 @@
         <p:spPr>
           <a:xfrm>
             <a:off x="516240" y="1664640"/>
-            <a:ext cx="7261560" cy="3376440"/>
+            <a:ext cx="7261200" cy="3376080"/>
           </a:xfrm>
           <a:prstGeom prst="rect">
             <a:avLst/>
@@ -21876,7 +22136,7 @@
         <p:spPr>
           <a:xfrm>
             <a:off x="920880" y="1347120"/>
-            <a:ext cx="10222200" cy="79920"/>
+            <a:ext cx="10221840" cy="79560"/>
           </a:xfrm>
           <a:prstGeom prst="rect">
             <a:avLst/>
@@ -21916,7 +22176,7 @@
         <p:spPr>
           <a:xfrm>
             <a:off x="920880" y="4299840"/>
-            <a:ext cx="10222200" cy="79920"/>
+            <a:ext cx="10221840" cy="79560"/>
           </a:xfrm>
           <a:prstGeom prst="rect">
             <a:avLst/>
@@ -21956,7 +22216,7 @@
         <p:spPr>
           <a:xfrm>
             <a:off x="920880" y="1484640"/>
-            <a:ext cx="10222200" cy="2742480"/>
+            <a:ext cx="10221840" cy="2742120"/>
           </a:xfrm>
           <a:prstGeom prst="rect">
             <a:avLst/>
@@ -21996,9 +22256,9 @@
         <p:grpSpPr>
           <a:xfrm>
             <a:off x="9649080" y="4069080"/>
-            <a:ext cx="1080360" cy="1080360"/>
+            <a:ext cx="1080000" cy="1080000"/>
             <a:chOff x="9649080" y="4069080"/>
-            <a:chExt cx="1080360" cy="1080360"/>
+            <a:chExt cx="1080000" cy="1080000"/>
           </a:xfrm>
         </p:grpSpPr>
         <p:sp>
@@ -22010,7 +22270,7 @@
           <p:spPr>
             <a:xfrm>
               <a:off x="9649080" y="4069080"/>
-              <a:ext cx="1080360" cy="1080360"/>
+              <a:ext cx="1080000" cy="1080000"/>
             </a:xfrm>
             <a:prstGeom prst="ellipse">
               <a:avLst/>
@@ -22040,7 +22300,7 @@
           <p:spPr>
             <a:xfrm>
               <a:off x="9757440" y="4177080"/>
-              <a:ext cx="864000" cy="864000"/>
+              <a:ext cx="863640" cy="863640"/>
             </a:xfrm>
             <a:prstGeom prst="ellipse">
               <a:avLst/>
@@ -22070,7 +22330,7 @@
         <p:spPr>
           <a:xfrm>
             <a:off x="0" y="0"/>
-            <a:ext cx="12188160" cy="6857280"/>
+            <a:ext cx="12187800" cy="6856920"/>
           </a:xfrm>
           <a:prstGeom prst="rect">
             <a:avLst/>
@@ -22106,7 +22366,7 @@
         <p:spPr>
           <a:xfrm>
             <a:off x="920880" y="928080"/>
-            <a:ext cx="10350360" cy="79920"/>
+            <a:ext cx="10350000" cy="79560"/>
           </a:xfrm>
           <a:prstGeom prst="rect">
             <a:avLst/>
@@ -22146,7 +22406,7 @@
         <p:spPr>
           <a:xfrm>
             <a:off x="7885440" y="1109880"/>
-            <a:ext cx="3385800" cy="4579560"/>
+            <a:ext cx="3385440" cy="4579200"/>
           </a:xfrm>
           <a:prstGeom prst="rect">
             <a:avLst/>
@@ -22190,7 +22450,7 @@
         <p:spPr>
           <a:xfrm>
             <a:off x="8200080" y="1432080"/>
-            <a:ext cx="2817720" cy="3357360"/>
+            <a:ext cx="2817360" cy="3357000"/>
           </a:xfrm>
           <a:prstGeom prst="rect">
             <a:avLst/>
@@ -22232,7 +22492,7 @@
         <p:spPr>
           <a:xfrm>
             <a:off x="920880" y="5780520"/>
-            <a:ext cx="10350360" cy="79920"/>
+            <a:ext cx="10350000" cy="79560"/>
           </a:xfrm>
           <a:prstGeom prst="rect">
             <a:avLst/>
@@ -22272,9 +22532,9 @@
         <p:grpSpPr>
           <a:xfrm>
             <a:off x="9646920" y="5257800"/>
-            <a:ext cx="1080360" cy="1080360"/>
+            <a:ext cx="1080000" cy="1080000"/>
             <a:chOff x="9646920" y="5257800"/>
-            <a:chExt cx="1080360" cy="1080360"/>
+            <a:chExt cx="1080000" cy="1080000"/>
           </a:xfrm>
         </p:grpSpPr>
         <p:sp>
@@ -22286,7 +22546,7 @@
           <p:spPr>
             <a:xfrm>
               <a:off x="9646920" y="5257800"/>
-              <a:ext cx="1080360" cy="1080360"/>
+              <a:ext cx="1080000" cy="1080000"/>
             </a:xfrm>
             <a:prstGeom prst="ellipse">
               <a:avLst/>
@@ -22316,7 +22576,7 @@
           <p:spPr>
             <a:xfrm>
               <a:off x="9754920" y="5365800"/>
-              <a:ext cx="864000" cy="864000"/>
+              <a:ext cx="863640" cy="863640"/>
             </a:xfrm>
             <a:prstGeom prst="ellipse">
               <a:avLst/>
@@ -22350,7 +22610,7 @@
         <p:spPr>
           <a:xfrm>
             <a:off x="1173600" y="1082520"/>
-            <a:ext cx="6067440" cy="4579560"/>
+            <a:ext cx="6067080" cy="4579200"/>
           </a:xfrm>
           <a:prstGeom prst="rect">
             <a:avLst/>
@@ -22406,7 +22666,7 @@
         <p:spPr>
           <a:xfrm>
             <a:off x="920880" y="1347120"/>
-            <a:ext cx="10222200" cy="79920"/>
+            <a:ext cx="10221840" cy="79560"/>
           </a:xfrm>
           <a:prstGeom prst="rect">
             <a:avLst/>
@@ -22446,7 +22706,7 @@
         <p:spPr>
           <a:xfrm>
             <a:off x="920880" y="4299840"/>
-            <a:ext cx="10222200" cy="79920"/>
+            <a:ext cx="10221840" cy="79560"/>
           </a:xfrm>
           <a:prstGeom prst="rect">
             <a:avLst/>
@@ -22486,7 +22746,7 @@
         <p:spPr>
           <a:xfrm>
             <a:off x="920880" y="1484640"/>
-            <a:ext cx="10222200" cy="2742480"/>
+            <a:ext cx="10221840" cy="2742120"/>
           </a:xfrm>
           <a:prstGeom prst="rect">
             <a:avLst/>
@@ -22526,9 +22786,9 @@
         <p:grpSpPr>
           <a:xfrm>
             <a:off x="9649080" y="4069080"/>
-            <a:ext cx="1080360" cy="1080360"/>
+            <a:ext cx="1080000" cy="1080000"/>
             <a:chOff x="9649080" y="4069080"/>
-            <a:chExt cx="1080360" cy="1080360"/>
+            <a:chExt cx="1080000" cy="1080000"/>
           </a:xfrm>
         </p:grpSpPr>
         <p:sp>
@@ -22540,7 +22800,7 @@
           <p:spPr>
             <a:xfrm>
               <a:off x="9649080" y="4069080"/>
-              <a:ext cx="1080360" cy="1080360"/>
+              <a:ext cx="1080000" cy="1080000"/>
             </a:xfrm>
             <a:prstGeom prst="ellipse">
               <a:avLst/>
@@ -22570,7 +22830,7 @@
           <p:spPr>
             <a:xfrm>
               <a:off x="9757440" y="4177080"/>
-              <a:ext cx="864000" cy="864000"/>
+              <a:ext cx="863640" cy="863640"/>
             </a:xfrm>
             <a:prstGeom prst="ellipse">
               <a:avLst/>
@@ -22600,7 +22860,7 @@
         <p:spPr>
           <a:xfrm>
             <a:off x="0" y="0"/>
-            <a:ext cx="12188160" cy="6857280"/>
+            <a:ext cx="12187800" cy="6856920"/>
           </a:xfrm>
           <a:prstGeom prst="rect">
             <a:avLst/>
@@ -22636,7 +22896,7 @@
         <p:spPr>
           <a:xfrm>
             <a:off x="920880" y="928080"/>
-            <a:ext cx="10350360" cy="79920"/>
+            <a:ext cx="10350000" cy="79560"/>
           </a:xfrm>
           <a:prstGeom prst="rect">
             <a:avLst/>
@@ -22676,7 +22936,7 @@
         <p:spPr>
           <a:xfrm>
             <a:off x="7885440" y="1109880"/>
-            <a:ext cx="3385800" cy="4579560"/>
+            <a:ext cx="3385440" cy="4579200"/>
           </a:xfrm>
           <a:prstGeom prst="rect">
             <a:avLst/>
@@ -22720,7 +22980,7 @@
         <p:spPr>
           <a:xfrm>
             <a:off x="8200080" y="1432080"/>
-            <a:ext cx="2817720" cy="3357360"/>
+            <a:ext cx="2817360" cy="3357000"/>
           </a:xfrm>
           <a:prstGeom prst="rect">
             <a:avLst/>
@@ -22762,7 +23022,7 @@
         <p:spPr>
           <a:xfrm>
             <a:off x="920880" y="5780520"/>
-            <a:ext cx="10350360" cy="79920"/>
+            <a:ext cx="10350000" cy="79560"/>
           </a:xfrm>
           <a:prstGeom prst="rect">
             <a:avLst/>
@@ -22802,9 +23062,9 @@
         <p:grpSpPr>
           <a:xfrm>
             <a:off x="9646920" y="5257800"/>
-            <a:ext cx="1080360" cy="1080360"/>
+            <a:ext cx="1080000" cy="1080000"/>
             <a:chOff x="9646920" y="5257800"/>
-            <a:chExt cx="1080360" cy="1080360"/>
+            <a:chExt cx="1080000" cy="1080000"/>
           </a:xfrm>
         </p:grpSpPr>
         <p:sp>
@@ -22816,7 +23076,7 @@
           <p:spPr>
             <a:xfrm>
               <a:off x="9646920" y="5257800"/>
-              <a:ext cx="1080360" cy="1080360"/>
+              <a:ext cx="1080000" cy="1080000"/>
             </a:xfrm>
             <a:prstGeom prst="ellipse">
               <a:avLst/>
@@ -22846,7 +23106,7 @@
           <p:spPr>
             <a:xfrm>
               <a:off x="9754920" y="5365800"/>
-              <a:ext cx="864000" cy="864000"/>
+              <a:ext cx="863640" cy="863640"/>
             </a:xfrm>
             <a:prstGeom prst="ellipse">
               <a:avLst/>
@@ -22876,7 +23136,7 @@
         <p:spPr>
           <a:xfrm>
             <a:off x="887400" y="540720"/>
-            <a:ext cx="6963840" cy="5478840"/>
+            <a:ext cx="6963480" cy="5478840"/>
           </a:xfrm>
           <a:prstGeom prst="rect">
             <a:avLst/>
@@ -24011,7 +24271,7 @@
         <p:spPr>
           <a:xfrm>
             <a:off x="0" y="0"/>
-            <a:ext cx="12191400" cy="6857280"/>
+            <a:ext cx="12191040" cy="6856920"/>
           </a:xfrm>
           <a:prstGeom prst="rect">
             <a:avLst/>
@@ -24047,7 +24307,7 @@
         <p:spPr>
           <a:xfrm>
             <a:off x="984600" y="464040"/>
-            <a:ext cx="10222200" cy="79920"/>
+            <a:ext cx="10221840" cy="79560"/>
           </a:xfrm>
           <a:prstGeom prst="rect">
             <a:avLst/>
@@ -24087,7 +24347,7 @@
         <p:spPr>
           <a:xfrm>
             <a:off x="984600" y="601920"/>
-            <a:ext cx="10222200" cy="1385280"/>
+            <a:ext cx="10221840" cy="1384920"/>
           </a:xfrm>
           <a:prstGeom prst="rect">
             <a:avLst/>
@@ -24127,7 +24387,7 @@
         <p:spPr>
           <a:xfrm>
             <a:off x="984600" y="2038680"/>
-            <a:ext cx="10222200" cy="79920"/>
+            <a:ext cx="10221840" cy="79560"/>
           </a:xfrm>
           <a:prstGeom prst="rect">
             <a:avLst/>
@@ -24171,7 +24431,7 @@
         <p:spPr>
           <a:xfrm>
             <a:off x="1069920" y="484560"/>
-            <a:ext cx="10057680" cy="1608480"/>
+            <a:ext cx="10057320" cy="1608120"/>
           </a:xfrm>
           <a:prstGeom prst="rect">
             <a:avLst/>
@@ -24217,7 +24477,7 @@
         <p:spPr>
           <a:xfrm>
             <a:off x="1069920" y="2320560"/>
-            <a:ext cx="10057680" cy="3850920"/>
+            <a:ext cx="10057320" cy="3850560"/>
           </a:xfrm>
           <a:prstGeom prst="rect">
             <a:avLst/>
@@ -24413,7 +24673,7 @@
         <p:spPr>
           <a:xfrm>
             <a:off x="11401560" y="6229800"/>
-            <a:ext cx="456480" cy="456480"/>
+            <a:ext cx="456120" cy="456120"/>
           </a:xfrm>
           <a:prstGeom prst="ellipse">
             <a:avLst/>
@@ -24443,7 +24703,7 @@
         <p:spPr>
           <a:xfrm>
             <a:off x="11431080" y="6258960"/>
-            <a:ext cx="398160" cy="398160"/>
+            <a:ext cx="397800" cy="397800"/>
           </a:xfrm>
           <a:prstGeom prst="ellipse">
             <a:avLst/>
@@ -24509,7 +24769,7 @@
         <p:spPr>
           <a:xfrm>
             <a:off x="0" y="0"/>
-            <a:ext cx="12191400" cy="6857280"/>
+            <a:ext cx="12191040" cy="6856920"/>
           </a:xfrm>
           <a:prstGeom prst="rect">
             <a:avLst/>
@@ -24545,7 +24805,7 @@
         <p:spPr>
           <a:xfrm>
             <a:off x="984600" y="464040"/>
-            <a:ext cx="10222200" cy="79920"/>
+            <a:ext cx="10221840" cy="79560"/>
           </a:xfrm>
           <a:prstGeom prst="rect">
             <a:avLst/>
@@ -24585,7 +24845,7 @@
         <p:spPr>
           <a:xfrm>
             <a:off x="984600" y="601920"/>
-            <a:ext cx="10222200" cy="1385280"/>
+            <a:ext cx="10221840" cy="1384920"/>
           </a:xfrm>
           <a:prstGeom prst="rect">
             <a:avLst/>
@@ -24625,7 +24885,7 @@
         <p:spPr>
           <a:xfrm>
             <a:off x="984600" y="2038680"/>
-            <a:ext cx="10222200" cy="79920"/>
+            <a:ext cx="10221840" cy="79560"/>
           </a:xfrm>
           <a:prstGeom prst="rect">
             <a:avLst/>
@@ -24669,7 +24929,7 @@
         <p:spPr>
           <a:xfrm>
             <a:off x="1069920" y="484560"/>
-            <a:ext cx="10057680" cy="1608480"/>
+            <a:ext cx="10057320" cy="1608120"/>
           </a:xfrm>
           <a:prstGeom prst="rect">
             <a:avLst/>
@@ -24711,7 +24971,7 @@
         <p:spPr>
           <a:xfrm>
             <a:off x="11401560" y="6229800"/>
-            <a:ext cx="456480" cy="456480"/>
+            <a:ext cx="456120" cy="456120"/>
           </a:xfrm>
           <a:prstGeom prst="ellipse">
             <a:avLst/>
@@ -24741,7 +25001,7 @@
         <p:spPr>
           <a:xfrm>
             <a:off x="11431080" y="6258960"/>
-            <a:ext cx="398160" cy="398160"/>
+            <a:ext cx="397800" cy="397800"/>
           </a:xfrm>
           <a:prstGeom prst="ellipse">
             <a:avLst/>
@@ -24768,14 +25028,14 @@
           <p:nvPr>
             <p:extLst>
               <p:ext uri="{D42A27DB-BD31-4B8C-83A1-F6EECF244321}">
-                <p14:modId xmlns:p14="http://schemas.microsoft.com/office/powerpoint/2010/main" val="1999787176"/>
+                <p14:modId xmlns:p14="http://schemas.microsoft.com/office/powerpoint/2010/main" val="2935504265"/>
               </p:ext>
             </p:extLst>
           </p:nvPr>
         </p:nvGraphicFramePr>
         <p:xfrm>
           <a:off x="917280" y="2300040"/>
-          <a:ext cx="4631400" cy="3850920"/>
+          <a:ext cx="4631040" cy="3850560"/>
         </p:xfrm>
         <a:graphic>
           <a:graphicData uri="http://schemas.openxmlformats.org/drawingml/2006/diagram">

</xml_diff>